<commit_message>
Update with final revision
</commit_message>
<xml_diff>
--- a/Presentation/Presentation.pptx
+++ b/Presentation/Presentation.pptx
@@ -5,20 +5,29 @@
     <p:sldMasterId id="2147483684" r:id="rId4"/>
   </p:sldMasterIdLst>
   <p:notesMasterIdLst>
-    <p:notesMasterId r:id="rId13"/>
+    <p:notesMasterId r:id="rId22"/>
   </p:notesMasterIdLst>
   <p:handoutMasterIdLst>
-    <p:handoutMasterId r:id="rId14"/>
+    <p:handoutMasterId r:id="rId23"/>
   </p:handoutMasterIdLst>
   <p:sldIdLst>
     <p:sldId id="256" r:id="rId5"/>
-    <p:sldId id="257" r:id="rId6"/>
-    <p:sldId id="341" r:id="rId7"/>
-    <p:sldId id="343" r:id="rId8"/>
-    <p:sldId id="344" r:id="rId9"/>
-    <p:sldId id="345" r:id="rId10"/>
-    <p:sldId id="346" r:id="rId11"/>
-    <p:sldId id="347" r:id="rId12"/>
+    <p:sldId id="341" r:id="rId6"/>
+    <p:sldId id="343" r:id="rId7"/>
+    <p:sldId id="344" r:id="rId8"/>
+    <p:sldId id="345" r:id="rId9"/>
+    <p:sldId id="346" r:id="rId10"/>
+    <p:sldId id="347" r:id="rId11"/>
+    <p:sldId id="348" r:id="rId12"/>
+    <p:sldId id="354" r:id="rId13"/>
+    <p:sldId id="352" r:id="rId14"/>
+    <p:sldId id="350" r:id="rId15"/>
+    <p:sldId id="351" r:id="rId16"/>
+    <p:sldId id="353" r:id="rId17"/>
+    <p:sldId id="355" r:id="rId18"/>
+    <p:sldId id="356" r:id="rId19"/>
+    <p:sldId id="357" r:id="rId20"/>
+    <p:sldId id="359" r:id="rId21"/>
   </p:sldIdLst>
   <p:sldSz cx="12192000" cy="6858000"/>
   <p:notesSz cx="6858000" cy="9144000"/>
@@ -233,7 +242,7 @@
           <a:p>
             <a:fld id="{187C06C4-C5A6-48FB-97F5-B20A44F857E9}" type="datetimeFigureOut">
               <a:rPr lang="en-US" smtClean="0"/>
-              <a:t>11/15/2023</a:t>
+              <a:t>4/22/2024</a:t>
             </a:fld>
             <a:endParaRPr lang="en-US"/>
           </a:p>
@@ -410,7 +419,7 @@
           <a:p>
             <a:fld id="{F8F2B2CC-0155-4E5E-A890-531D58ADF5B2}" type="datetimeFigureOut">
               <a:rPr lang="en-US" smtClean="0"/>
-              <a:t>11/15/2023</a:t>
+              <a:t>4/22/2024</a:t>
             </a:fld>
             <a:endParaRPr lang="en-US"/>
           </a:p>
@@ -1597,7 +1606,7 @@
                 </a:solidFill>
               </a:rPr>
               <a:pPr/>
-              <a:t>11/15/2023</a:t>
+              <a:t>4/22/2024</a:t>
             </a:fld>
             <a:endParaRPr lang="en-US" dirty="0">
               <a:solidFill>
@@ -8809,6 +8818,1539 @@
 </p:sld>
 </file>
 
+<file path=ppt/slides/slide10.xml><?xml version="1.0" encoding="utf-8"?>
+<p:sld xmlns:a="http://schemas.openxmlformats.org/drawingml/2006/main" xmlns:r="http://schemas.openxmlformats.org/officeDocument/2006/relationships" xmlns:p="http://schemas.openxmlformats.org/presentationml/2006/main">
+  <p:cSld>
+    <p:spTree>
+      <p:nvGrpSpPr>
+        <p:cNvPr id="1" name=""/>
+        <p:cNvGrpSpPr/>
+        <p:nvPr/>
+      </p:nvGrpSpPr>
+      <p:grpSpPr>
+        <a:xfrm>
+          <a:off x="0" y="0"/>
+          <a:ext cx="0" cy="0"/>
+          <a:chOff x="0" y="0"/>
+          <a:chExt cx="0" cy="0"/>
+        </a:xfrm>
+      </p:grpSpPr>
+      <p:sp>
+        <p:nvSpPr>
+          <p:cNvPr id="2" name="Title 1">
+            <a:extLst>
+              <a:ext uri="{FF2B5EF4-FFF2-40B4-BE49-F238E27FC236}">
+                <a16:creationId xmlns:a16="http://schemas.microsoft.com/office/drawing/2014/main" id="{C42FCCEC-E2CB-B247-FCF3-0F7D9531636E}"/>
+              </a:ext>
+            </a:extLst>
+          </p:cNvPr>
+          <p:cNvSpPr>
+            <a:spLocks noGrp="1"/>
+          </p:cNvSpPr>
+          <p:nvPr>
+            <p:ph type="ctrTitle"/>
+          </p:nvPr>
+        </p:nvSpPr>
+        <p:spPr>
+          <a:xfrm>
+            <a:off x="1524000" y="2339912"/>
+            <a:ext cx="9144000" cy="2387600"/>
+          </a:xfrm>
+        </p:spPr>
+        <p:txBody>
+          <a:bodyPr>
+            <a:normAutofit fontScale="90000"/>
+          </a:bodyPr>
+          <a:lstStyle/>
+          <a:p>
+            <a:r>
+              <a:rPr lang="en-US" dirty="0"/>
+              <a:t>Are are the NIST-selected post-quantum cryptographic algorithms feasible with large payloads? </a:t>
+            </a:r>
+          </a:p>
+        </p:txBody>
+      </p:sp>
+      <p:sp>
+        <p:nvSpPr>
+          <p:cNvPr id="6" name="Slide Number Placeholder 5">
+            <a:extLst>
+              <a:ext uri="{FF2B5EF4-FFF2-40B4-BE49-F238E27FC236}">
+                <a16:creationId xmlns:a16="http://schemas.microsoft.com/office/drawing/2014/main" id="{181566C2-68F3-46EE-AA74-CC6E519864F3}"/>
+              </a:ext>
+            </a:extLst>
+          </p:cNvPr>
+          <p:cNvSpPr>
+            <a:spLocks noGrp="1"/>
+          </p:cNvSpPr>
+          <p:nvPr>
+            <p:ph type="sldNum" sz="quarter" idx="12"/>
+          </p:nvPr>
+        </p:nvSpPr>
+        <p:spPr/>
+        <p:txBody>
+          <a:bodyPr/>
+          <a:lstStyle/>
+          <a:p>
+            <a:fld id="{28844951-7827-47D4-8276-7DDE1FA7D85A}" type="slidenum">
+              <a:rPr lang="en-US" smtClean="0"/>
+              <a:t>10</a:t>
+            </a:fld>
+            <a:endParaRPr lang="en-US"/>
+          </a:p>
+        </p:txBody>
+      </p:sp>
+    </p:spTree>
+    <p:extLst>
+      <p:ext uri="{BB962C8B-B14F-4D97-AF65-F5344CB8AC3E}">
+        <p14:creationId xmlns:p14="http://schemas.microsoft.com/office/powerpoint/2010/main" val="55948776"/>
+      </p:ext>
+    </p:extLst>
+  </p:cSld>
+  <p:clrMapOvr>
+    <a:masterClrMapping/>
+  </p:clrMapOvr>
+</p:sld>
+</file>
+
+<file path=ppt/slides/slide11.xml><?xml version="1.0" encoding="utf-8"?>
+<p:sld xmlns:a="http://schemas.openxmlformats.org/drawingml/2006/main" xmlns:r="http://schemas.openxmlformats.org/officeDocument/2006/relationships" xmlns:p="http://schemas.openxmlformats.org/presentationml/2006/main">
+  <p:cSld>
+    <p:spTree>
+      <p:nvGrpSpPr>
+        <p:cNvPr id="1" name="">
+          <a:extLst>
+            <a:ext uri="{FF2B5EF4-FFF2-40B4-BE49-F238E27FC236}">
+              <a16:creationId xmlns:a16="http://schemas.microsoft.com/office/drawing/2014/main" id="{8B6EA702-6651-F319-E9DA-E433A7132B29}"/>
+            </a:ext>
+          </a:extLst>
+        </p:cNvPr>
+        <p:cNvGrpSpPr/>
+        <p:nvPr/>
+      </p:nvGrpSpPr>
+      <p:grpSpPr>
+        <a:xfrm>
+          <a:off x="0" y="0"/>
+          <a:ext cx="0" cy="0"/>
+          <a:chOff x="0" y="0"/>
+          <a:chExt cx="0" cy="0"/>
+        </a:xfrm>
+      </p:grpSpPr>
+      <p:sp>
+        <p:nvSpPr>
+          <p:cNvPr id="2" name="Content Placeholder 1">
+            <a:extLst>
+              <a:ext uri="{FF2B5EF4-FFF2-40B4-BE49-F238E27FC236}">
+                <a16:creationId xmlns:a16="http://schemas.microsoft.com/office/drawing/2014/main" id="{4FB9CA21-7C5F-FD63-C35C-18E7AA59C828}"/>
+              </a:ext>
+            </a:extLst>
+          </p:cNvPr>
+          <p:cNvSpPr>
+            <a:spLocks noGrp="1"/>
+          </p:cNvSpPr>
+          <p:nvPr>
+            <p:ph sz="half" idx="2"/>
+          </p:nvPr>
+        </p:nvSpPr>
+        <p:spPr>
+          <a:xfrm>
+            <a:off x="839788" y="2006600"/>
+            <a:ext cx="10514012" cy="4000183"/>
+          </a:xfrm>
+        </p:spPr>
+        <p:txBody>
+          <a:bodyPr>
+            <a:normAutofit fontScale="92500" lnSpcReduction="10000"/>
+          </a:bodyPr>
+          <a:lstStyle/>
+          <a:p>
+            <a:r>
+              <a:rPr lang="en-US" dirty="0"/>
+              <a:t>Benchmark </a:t>
+            </a:r>
+            <a:r>
+              <a:rPr lang="en-US" b="1" dirty="0"/>
+              <a:t>two algorithms</a:t>
+            </a:r>
+            <a:r>
+              <a:rPr lang="en-US" dirty="0"/>
+              <a:t>: </a:t>
+            </a:r>
+            <a:r>
+              <a:rPr lang="en-US" dirty="0" err="1"/>
+              <a:t>Kyber</a:t>
+            </a:r>
+            <a:r>
+              <a:rPr lang="en-US" dirty="0"/>
+              <a:t> (Post-quantum) and ECC (state of the art)</a:t>
+            </a:r>
+          </a:p>
+          <a:p>
+            <a:endParaRPr lang="en-US" dirty="0"/>
+          </a:p>
+          <a:p>
+            <a:r>
+              <a:rPr lang="en-US" dirty="0"/>
+              <a:t>Use </a:t>
+            </a:r>
+            <a:r>
+              <a:rPr lang="en-US" b="1" dirty="0"/>
+              <a:t>KEM </a:t>
+            </a:r>
+            <a:r>
+              <a:rPr lang="en-US" dirty="0"/>
+              <a:t>implementations of both algorithms. A KEM is a set of three algorithms…</a:t>
+            </a:r>
+          </a:p>
+          <a:p>
+            <a:pPr lvl="1"/>
+            <a:r>
+              <a:rPr lang="en-US" dirty="0"/>
+              <a:t>Key generation</a:t>
+            </a:r>
+          </a:p>
+          <a:p>
+            <a:pPr lvl="1"/>
+            <a:r>
+              <a:rPr lang="en-US" dirty="0"/>
+              <a:t>Encryption</a:t>
+            </a:r>
+          </a:p>
+          <a:p>
+            <a:pPr lvl="1"/>
+            <a:r>
+              <a:rPr lang="en-US" dirty="0"/>
+              <a:t>Decryption</a:t>
+            </a:r>
+          </a:p>
+          <a:p>
+            <a:pPr lvl="1"/>
+            <a:r>
+              <a:rPr lang="en-US" dirty="0"/>
+              <a:t>(“Module-Lattice-Based Key Encapsulation Mechanism Standard”)</a:t>
+            </a:r>
+          </a:p>
+          <a:p>
+            <a:pPr lvl="1"/>
+            <a:endParaRPr lang="en-US" dirty="0"/>
+          </a:p>
+          <a:p>
+            <a:r>
+              <a:rPr lang="en-US" dirty="0"/>
+              <a:t>Test: Memory usage, Processor usage, </a:t>
+            </a:r>
+            <a:r>
+              <a:rPr lang="en-US" b="1" dirty="0"/>
+              <a:t>and time taken</a:t>
+            </a:r>
+          </a:p>
+          <a:p>
+            <a:endParaRPr lang="en-US" b="1" dirty="0"/>
+          </a:p>
+          <a:p>
+            <a:r>
+              <a:rPr lang="en-US" dirty="0"/>
+              <a:t>Memory usage, processor usage less important (as seen later)</a:t>
+            </a:r>
+          </a:p>
+        </p:txBody>
+      </p:sp>
+      <p:sp>
+        <p:nvSpPr>
+          <p:cNvPr id="6" name="Slide Number Placeholder 5">
+            <a:extLst>
+              <a:ext uri="{FF2B5EF4-FFF2-40B4-BE49-F238E27FC236}">
+                <a16:creationId xmlns:a16="http://schemas.microsoft.com/office/drawing/2014/main" id="{705457CF-BE91-26C6-36C6-86CBC2944AA2}"/>
+              </a:ext>
+            </a:extLst>
+          </p:cNvPr>
+          <p:cNvSpPr>
+            <a:spLocks noGrp="1"/>
+          </p:cNvSpPr>
+          <p:nvPr>
+            <p:ph type="sldNum" sz="quarter" idx="12"/>
+          </p:nvPr>
+        </p:nvSpPr>
+        <p:spPr/>
+        <p:txBody>
+          <a:bodyPr/>
+          <a:lstStyle/>
+          <a:p>
+            <a:fld id="{28844951-7827-47D4-8276-7DDE1FA7D85A}" type="slidenum">
+              <a:rPr lang="en-US" smtClean="0"/>
+              <a:t>11</a:t>
+            </a:fld>
+            <a:endParaRPr lang="en-US"/>
+          </a:p>
+        </p:txBody>
+      </p:sp>
+      <p:sp>
+        <p:nvSpPr>
+          <p:cNvPr id="7" name="Title 6">
+            <a:extLst>
+              <a:ext uri="{FF2B5EF4-FFF2-40B4-BE49-F238E27FC236}">
+                <a16:creationId xmlns:a16="http://schemas.microsoft.com/office/drawing/2014/main" id="{B2C836FA-D863-27FA-B41B-E6017461754B}"/>
+              </a:ext>
+            </a:extLst>
+          </p:cNvPr>
+          <p:cNvSpPr>
+            <a:spLocks noGrp="1"/>
+          </p:cNvSpPr>
+          <p:nvPr>
+            <p:ph type="title"/>
+          </p:nvPr>
+        </p:nvSpPr>
+        <p:spPr/>
+        <p:txBody>
+          <a:bodyPr>
+            <a:normAutofit/>
+          </a:bodyPr>
+          <a:lstStyle/>
+          <a:p>
+            <a:r>
+              <a:rPr lang="en-US" dirty="0"/>
+              <a:t>The Method</a:t>
+            </a:r>
+          </a:p>
+        </p:txBody>
+      </p:sp>
+    </p:spTree>
+    <p:extLst>
+      <p:ext uri="{BB962C8B-B14F-4D97-AF65-F5344CB8AC3E}">
+        <p14:creationId xmlns:p14="http://schemas.microsoft.com/office/powerpoint/2010/main" val="2667020010"/>
+      </p:ext>
+    </p:extLst>
+  </p:cSld>
+  <p:clrMapOvr>
+    <a:masterClrMapping/>
+  </p:clrMapOvr>
+</p:sld>
+</file>
+
+<file path=ppt/slides/slide12.xml><?xml version="1.0" encoding="utf-8"?>
+<p:sld xmlns:a="http://schemas.openxmlformats.org/drawingml/2006/main" xmlns:r="http://schemas.openxmlformats.org/officeDocument/2006/relationships" xmlns:p="http://schemas.openxmlformats.org/presentationml/2006/main">
+  <p:cSld>
+    <p:spTree>
+      <p:nvGrpSpPr>
+        <p:cNvPr id="1" name="">
+          <a:extLst>
+            <a:ext uri="{FF2B5EF4-FFF2-40B4-BE49-F238E27FC236}">
+              <a16:creationId xmlns:a16="http://schemas.microsoft.com/office/drawing/2014/main" id="{8B6EA702-6651-F319-E9DA-E433A7132B29}"/>
+            </a:ext>
+          </a:extLst>
+        </p:cNvPr>
+        <p:cNvGrpSpPr/>
+        <p:nvPr/>
+      </p:nvGrpSpPr>
+      <p:grpSpPr>
+        <a:xfrm>
+          <a:off x="0" y="0"/>
+          <a:ext cx="0" cy="0"/>
+          <a:chOff x="0" y="0"/>
+          <a:chExt cx="0" cy="0"/>
+        </a:xfrm>
+      </p:grpSpPr>
+      <p:sp>
+        <p:nvSpPr>
+          <p:cNvPr id="2" name="Content Placeholder 1">
+            <a:extLst>
+              <a:ext uri="{FF2B5EF4-FFF2-40B4-BE49-F238E27FC236}">
+                <a16:creationId xmlns:a16="http://schemas.microsoft.com/office/drawing/2014/main" id="{4FB9CA21-7C5F-FD63-C35C-18E7AA59C828}"/>
+              </a:ext>
+            </a:extLst>
+          </p:cNvPr>
+          <p:cNvSpPr>
+            <a:spLocks noGrp="1"/>
+          </p:cNvSpPr>
+          <p:nvPr>
+            <p:ph sz="half" idx="2"/>
+          </p:nvPr>
+        </p:nvSpPr>
+        <p:spPr>
+          <a:xfrm>
+            <a:off x="839788" y="2006600"/>
+            <a:ext cx="10514012" cy="4000183"/>
+          </a:xfrm>
+        </p:spPr>
+        <p:txBody>
+          <a:bodyPr>
+            <a:normAutofit/>
+          </a:bodyPr>
+          <a:lstStyle/>
+          <a:p>
+            <a:r>
+              <a:rPr lang="en-US" dirty="0"/>
+              <a:t>ECC is the </a:t>
+            </a:r>
+            <a:r>
+              <a:rPr lang="en-US" b="1" dirty="0"/>
+              <a:t>gold standard</a:t>
+            </a:r>
+            <a:r>
+              <a:rPr lang="en-US" dirty="0"/>
+              <a:t> of fast, traditional, state-of-the-art cryptography</a:t>
+            </a:r>
+          </a:p>
+          <a:p>
+            <a:endParaRPr lang="en-US" dirty="0"/>
+          </a:p>
+          <a:p>
+            <a:r>
+              <a:rPr lang="en-US" dirty="0" err="1"/>
+              <a:t>Kyber</a:t>
+            </a:r>
+            <a:r>
+              <a:rPr lang="en-US" dirty="0"/>
+              <a:t> is </a:t>
+            </a:r>
+            <a:r>
+              <a:rPr lang="en-US" b="1" dirty="0"/>
+              <a:t>outlined by NIST </a:t>
+            </a:r>
+            <a:r>
+              <a:rPr lang="en-US" dirty="0"/>
+              <a:t>as the preferred post-quantum cryptographic algorithm</a:t>
+            </a:r>
+          </a:p>
+          <a:p>
+            <a:pPr lvl="1"/>
+            <a:endParaRPr lang="en-US" dirty="0"/>
+          </a:p>
+          <a:p>
+            <a:r>
+              <a:rPr lang="en-US" dirty="0"/>
+              <a:t>Error may be introduced by using our </a:t>
+            </a:r>
+            <a:r>
+              <a:rPr lang="en-US" b="1" dirty="0"/>
+              <a:t>own implementation</a:t>
+            </a:r>
+          </a:p>
+          <a:p>
+            <a:pPr lvl="1"/>
+            <a:endParaRPr lang="en-US" dirty="0"/>
+          </a:p>
+          <a:p>
+            <a:r>
+              <a:rPr lang="en-US" dirty="0"/>
+              <a:t>Use the </a:t>
+            </a:r>
+            <a:r>
+              <a:rPr lang="en-US" b="1" dirty="0"/>
+              <a:t>standard, official, NIST-specified </a:t>
+            </a:r>
+            <a:r>
+              <a:rPr lang="en-US" dirty="0" err="1"/>
+              <a:t>Kyber</a:t>
+            </a:r>
+            <a:r>
+              <a:rPr lang="en-US" dirty="0"/>
+              <a:t> implementation</a:t>
+            </a:r>
+          </a:p>
+          <a:p>
+            <a:endParaRPr lang="en-US" dirty="0"/>
+          </a:p>
+          <a:p>
+            <a:r>
+              <a:rPr lang="en-US" dirty="0"/>
+              <a:t>Based on 2018 Pennsylvania State University algorithmic analysis study </a:t>
+            </a:r>
+          </a:p>
+        </p:txBody>
+      </p:sp>
+      <p:sp>
+        <p:nvSpPr>
+          <p:cNvPr id="6" name="Slide Number Placeholder 5">
+            <a:extLst>
+              <a:ext uri="{FF2B5EF4-FFF2-40B4-BE49-F238E27FC236}">
+                <a16:creationId xmlns:a16="http://schemas.microsoft.com/office/drawing/2014/main" id="{705457CF-BE91-26C6-36C6-86CBC2944AA2}"/>
+              </a:ext>
+            </a:extLst>
+          </p:cNvPr>
+          <p:cNvSpPr>
+            <a:spLocks noGrp="1"/>
+          </p:cNvSpPr>
+          <p:nvPr>
+            <p:ph type="sldNum" sz="quarter" idx="12"/>
+          </p:nvPr>
+        </p:nvSpPr>
+        <p:spPr/>
+        <p:txBody>
+          <a:bodyPr/>
+          <a:lstStyle/>
+          <a:p>
+            <a:fld id="{28844951-7827-47D4-8276-7DDE1FA7D85A}" type="slidenum">
+              <a:rPr lang="en-US" smtClean="0"/>
+              <a:t>12</a:t>
+            </a:fld>
+            <a:endParaRPr lang="en-US"/>
+          </a:p>
+        </p:txBody>
+      </p:sp>
+      <p:sp>
+        <p:nvSpPr>
+          <p:cNvPr id="7" name="Title 6">
+            <a:extLst>
+              <a:ext uri="{FF2B5EF4-FFF2-40B4-BE49-F238E27FC236}">
+                <a16:creationId xmlns:a16="http://schemas.microsoft.com/office/drawing/2014/main" id="{B2C836FA-D863-27FA-B41B-E6017461754B}"/>
+              </a:ext>
+            </a:extLst>
+          </p:cNvPr>
+          <p:cNvSpPr>
+            <a:spLocks noGrp="1"/>
+          </p:cNvSpPr>
+          <p:nvPr>
+            <p:ph type="title"/>
+          </p:nvPr>
+        </p:nvSpPr>
+        <p:spPr/>
+        <p:txBody>
+          <a:bodyPr>
+            <a:normAutofit/>
+          </a:bodyPr>
+          <a:lstStyle/>
+          <a:p>
+            <a:r>
+              <a:rPr lang="en-US" dirty="0"/>
+              <a:t>Why this Method? </a:t>
+            </a:r>
+          </a:p>
+        </p:txBody>
+      </p:sp>
+    </p:spTree>
+    <p:extLst>
+      <p:ext uri="{BB962C8B-B14F-4D97-AF65-F5344CB8AC3E}">
+        <p14:creationId xmlns:p14="http://schemas.microsoft.com/office/powerpoint/2010/main" val="1148651665"/>
+      </p:ext>
+    </p:extLst>
+  </p:cSld>
+  <p:clrMapOvr>
+    <a:masterClrMapping/>
+  </p:clrMapOvr>
+</p:sld>
+</file>
+
+<file path=ppt/slides/slide13.xml><?xml version="1.0" encoding="utf-8"?>
+<p:sld xmlns:a="http://schemas.openxmlformats.org/drawingml/2006/main" xmlns:r="http://schemas.openxmlformats.org/officeDocument/2006/relationships" xmlns:p="http://schemas.openxmlformats.org/presentationml/2006/main">
+  <p:cSld>
+    <p:spTree>
+      <p:nvGrpSpPr>
+        <p:cNvPr id="1" name="">
+          <a:extLst>
+            <a:ext uri="{FF2B5EF4-FFF2-40B4-BE49-F238E27FC236}">
+              <a16:creationId xmlns:a16="http://schemas.microsoft.com/office/drawing/2014/main" id="{8B6EA702-6651-F319-E9DA-E433A7132B29}"/>
+            </a:ext>
+          </a:extLst>
+        </p:cNvPr>
+        <p:cNvGrpSpPr/>
+        <p:nvPr/>
+      </p:nvGrpSpPr>
+      <p:grpSpPr>
+        <a:xfrm>
+          <a:off x="0" y="0"/>
+          <a:ext cx="0" cy="0"/>
+          <a:chOff x="0" y="0"/>
+          <a:chExt cx="0" cy="0"/>
+        </a:xfrm>
+      </p:grpSpPr>
+      <p:sp>
+        <p:nvSpPr>
+          <p:cNvPr id="2" name="Content Placeholder 1">
+            <a:extLst>
+              <a:ext uri="{FF2B5EF4-FFF2-40B4-BE49-F238E27FC236}">
+                <a16:creationId xmlns:a16="http://schemas.microsoft.com/office/drawing/2014/main" id="{4FB9CA21-7C5F-FD63-C35C-18E7AA59C828}"/>
+              </a:ext>
+            </a:extLst>
+          </p:cNvPr>
+          <p:cNvSpPr>
+            <a:spLocks noGrp="1"/>
+          </p:cNvSpPr>
+          <p:nvPr>
+            <p:ph sz="half" idx="2"/>
+          </p:nvPr>
+        </p:nvSpPr>
+        <p:spPr>
+          <a:xfrm>
+            <a:off x="839788" y="2006600"/>
+            <a:ext cx="10514012" cy="4000183"/>
+          </a:xfrm>
+        </p:spPr>
+        <p:txBody>
+          <a:bodyPr>
+            <a:normAutofit/>
+          </a:bodyPr>
+          <a:lstStyle/>
+          <a:p>
+            <a:r>
+              <a:rPr lang="en-US" dirty="0"/>
+              <a:t>Other studies about  post-quantum cryptographic algorithms </a:t>
+            </a:r>
+            <a:r>
+              <a:rPr lang="en-US" b="1" dirty="0"/>
+              <a:t>also test </a:t>
+            </a:r>
+            <a:r>
+              <a:rPr lang="en-US" b="1" dirty="0" err="1"/>
+              <a:t>Kyber</a:t>
+            </a:r>
+            <a:r>
+              <a:rPr lang="en-US" b="1" dirty="0"/>
+              <a:t> using a KEM</a:t>
+            </a:r>
+          </a:p>
+          <a:p>
+            <a:pPr lvl="1"/>
+            <a:r>
+              <a:rPr lang="en-US" dirty="0"/>
+              <a:t>(</a:t>
+            </a:r>
+            <a:r>
+              <a:rPr lang="en-US" dirty="0" err="1"/>
+              <a:t>Ristov</a:t>
+            </a:r>
+            <a:r>
+              <a:rPr lang="en-US" dirty="0"/>
+              <a:t> and </a:t>
+            </a:r>
+            <a:r>
+              <a:rPr lang="en-US" dirty="0" err="1"/>
+              <a:t>Koceski</a:t>
+            </a:r>
+            <a:r>
+              <a:rPr lang="en-US" dirty="0"/>
+              <a:t>)</a:t>
+            </a:r>
+          </a:p>
+          <a:p>
+            <a:pPr lvl="1"/>
+            <a:r>
+              <a:rPr lang="en-US" dirty="0"/>
+              <a:t>(Dhillon and Kalra)</a:t>
+            </a:r>
+          </a:p>
+          <a:p>
+            <a:endParaRPr lang="en-US" dirty="0"/>
+          </a:p>
+          <a:p>
+            <a:r>
+              <a:rPr lang="en-US" dirty="0"/>
+              <a:t>Combination of more classic studies which </a:t>
+            </a:r>
+            <a:r>
+              <a:rPr lang="en-US" b="1" dirty="0"/>
+              <a:t>study encryption and decryption separately</a:t>
+            </a:r>
+          </a:p>
+          <a:p>
+            <a:pPr lvl="1"/>
+            <a:r>
+              <a:rPr lang="en-US" dirty="0"/>
+              <a:t>2021 Study of Post-Quantum Cryptographic feasibility on small systems</a:t>
+            </a:r>
+          </a:p>
+          <a:p>
+            <a:pPr marL="571500" lvl="1" indent="0">
+              <a:buNone/>
+            </a:pPr>
+            <a:endParaRPr lang="en-US" dirty="0"/>
+          </a:p>
+          <a:p>
+            <a:r>
+              <a:rPr lang="en-US" dirty="0" err="1"/>
+              <a:t>Kyber</a:t>
+            </a:r>
+            <a:r>
+              <a:rPr lang="en-US" dirty="0"/>
+              <a:t> implementation from </a:t>
+            </a:r>
+            <a:r>
+              <a:rPr lang="en-US" b="1" dirty="0"/>
+              <a:t>official </a:t>
+            </a:r>
+            <a:r>
+              <a:rPr lang="en-US" b="1" dirty="0" err="1"/>
+              <a:t>Kyber</a:t>
+            </a:r>
+            <a:r>
+              <a:rPr lang="en-US" b="1" dirty="0"/>
+              <a:t> implementation </a:t>
+            </a:r>
+            <a:r>
+              <a:rPr lang="en-US" dirty="0"/>
+              <a:t>in C++</a:t>
+            </a:r>
+          </a:p>
+          <a:p>
+            <a:endParaRPr lang="en-US" dirty="0"/>
+          </a:p>
+          <a:p>
+            <a:r>
+              <a:rPr lang="en-US" dirty="0"/>
+              <a:t>ECC implementation from </a:t>
+            </a:r>
+            <a:r>
+              <a:rPr lang="en-US" b="1" dirty="0" err="1"/>
+              <a:t>CryptoPP</a:t>
+            </a:r>
+            <a:r>
+              <a:rPr lang="en-US" b="1" dirty="0"/>
+              <a:t> (standard library)</a:t>
+            </a:r>
+          </a:p>
+          <a:p>
+            <a:endParaRPr lang="en-US" dirty="0"/>
+          </a:p>
+        </p:txBody>
+      </p:sp>
+      <p:sp>
+        <p:nvSpPr>
+          <p:cNvPr id="6" name="Slide Number Placeholder 5">
+            <a:extLst>
+              <a:ext uri="{FF2B5EF4-FFF2-40B4-BE49-F238E27FC236}">
+                <a16:creationId xmlns:a16="http://schemas.microsoft.com/office/drawing/2014/main" id="{705457CF-BE91-26C6-36C6-86CBC2944AA2}"/>
+              </a:ext>
+            </a:extLst>
+          </p:cNvPr>
+          <p:cNvSpPr>
+            <a:spLocks noGrp="1"/>
+          </p:cNvSpPr>
+          <p:nvPr>
+            <p:ph type="sldNum" sz="quarter" idx="12"/>
+          </p:nvPr>
+        </p:nvSpPr>
+        <p:spPr/>
+        <p:txBody>
+          <a:bodyPr/>
+          <a:lstStyle/>
+          <a:p>
+            <a:fld id="{28844951-7827-47D4-8276-7DDE1FA7D85A}" type="slidenum">
+              <a:rPr lang="en-US" smtClean="0"/>
+              <a:t>13</a:t>
+            </a:fld>
+            <a:endParaRPr lang="en-US"/>
+          </a:p>
+        </p:txBody>
+      </p:sp>
+      <p:sp>
+        <p:nvSpPr>
+          <p:cNvPr id="7" name="Title 6">
+            <a:extLst>
+              <a:ext uri="{FF2B5EF4-FFF2-40B4-BE49-F238E27FC236}">
+                <a16:creationId xmlns:a16="http://schemas.microsoft.com/office/drawing/2014/main" id="{B2C836FA-D863-27FA-B41B-E6017461754B}"/>
+              </a:ext>
+            </a:extLst>
+          </p:cNvPr>
+          <p:cNvSpPr>
+            <a:spLocks noGrp="1"/>
+          </p:cNvSpPr>
+          <p:nvPr>
+            <p:ph type="title"/>
+          </p:nvPr>
+        </p:nvSpPr>
+        <p:spPr/>
+        <p:txBody>
+          <a:bodyPr>
+            <a:normAutofit/>
+          </a:bodyPr>
+          <a:lstStyle/>
+          <a:p>
+            <a:r>
+              <a:rPr lang="en-US" dirty="0"/>
+              <a:t>Why this Method? </a:t>
+            </a:r>
+          </a:p>
+        </p:txBody>
+      </p:sp>
+    </p:spTree>
+    <p:extLst>
+      <p:ext uri="{BB962C8B-B14F-4D97-AF65-F5344CB8AC3E}">
+        <p14:creationId xmlns:p14="http://schemas.microsoft.com/office/powerpoint/2010/main" val="3087260812"/>
+      </p:ext>
+    </p:extLst>
+  </p:cSld>
+  <p:clrMapOvr>
+    <a:masterClrMapping/>
+  </p:clrMapOvr>
+</p:sld>
+</file>
+
+<file path=ppt/slides/slide14.xml><?xml version="1.0" encoding="utf-8"?>
+<p:sld xmlns:a="http://schemas.openxmlformats.org/drawingml/2006/main" xmlns:r="http://schemas.openxmlformats.org/officeDocument/2006/relationships" xmlns:p="http://schemas.openxmlformats.org/presentationml/2006/main">
+  <p:cSld>
+    <p:spTree>
+      <p:nvGrpSpPr>
+        <p:cNvPr id="1" name="">
+          <a:extLst>
+            <a:ext uri="{FF2B5EF4-FFF2-40B4-BE49-F238E27FC236}">
+              <a16:creationId xmlns:a16="http://schemas.microsoft.com/office/drawing/2014/main" id="{8B6EA702-6651-F319-E9DA-E433A7132B29}"/>
+            </a:ext>
+          </a:extLst>
+        </p:cNvPr>
+        <p:cNvGrpSpPr/>
+        <p:nvPr/>
+      </p:nvGrpSpPr>
+      <p:grpSpPr>
+        <a:xfrm>
+          <a:off x="0" y="0"/>
+          <a:ext cx="0" cy="0"/>
+          <a:chOff x="0" y="0"/>
+          <a:chExt cx="0" cy="0"/>
+        </a:xfrm>
+      </p:grpSpPr>
+      <p:sp>
+        <p:nvSpPr>
+          <p:cNvPr id="2" name="Content Placeholder 1">
+            <a:extLst>
+              <a:ext uri="{FF2B5EF4-FFF2-40B4-BE49-F238E27FC236}">
+                <a16:creationId xmlns:a16="http://schemas.microsoft.com/office/drawing/2014/main" id="{4FB9CA21-7C5F-FD63-C35C-18E7AA59C828}"/>
+              </a:ext>
+            </a:extLst>
+          </p:cNvPr>
+          <p:cNvSpPr>
+            <a:spLocks noGrp="1"/>
+          </p:cNvSpPr>
+          <p:nvPr>
+            <p:ph sz="half" idx="2"/>
+          </p:nvPr>
+        </p:nvSpPr>
+        <p:spPr>
+          <a:xfrm>
+            <a:off x="7664418" y="2006600"/>
+            <a:ext cx="3689382" cy="4000183"/>
+          </a:xfrm>
+        </p:spPr>
+        <p:txBody>
+          <a:bodyPr>
+            <a:normAutofit/>
+          </a:bodyPr>
+          <a:lstStyle/>
+          <a:p>
+            <a:r>
+              <a:rPr lang="en-US" dirty="0"/>
+              <a:t>CPU and Memory was consistent, with</a:t>
+            </a:r>
+            <a:r>
+              <a:rPr lang="en-US" b="1" dirty="0"/>
+              <a:t> no significant change across different parameters. </a:t>
+            </a:r>
+          </a:p>
+          <a:p>
+            <a:endParaRPr lang="en-US" b="1" dirty="0"/>
+          </a:p>
+          <a:p>
+            <a:r>
+              <a:rPr lang="en-US" dirty="0"/>
+              <a:t>This is likely due to </a:t>
+            </a:r>
+            <a:r>
+              <a:rPr lang="en-US" b="1" dirty="0"/>
+              <a:t>segmentation</a:t>
+            </a:r>
+            <a:r>
+              <a:rPr lang="en-US" dirty="0"/>
+              <a:t>, which is </a:t>
+            </a:r>
+            <a:r>
+              <a:rPr lang="en-US" b="1" dirty="0"/>
+              <a:t>inherent to </a:t>
+            </a:r>
+            <a:r>
+              <a:rPr lang="en-US" b="1" dirty="0" err="1"/>
+              <a:t>Kyber</a:t>
+            </a:r>
+            <a:r>
+              <a:rPr lang="en-US" b="1" dirty="0"/>
+              <a:t>. </a:t>
+            </a:r>
+            <a:endParaRPr lang="en-US" dirty="0"/>
+          </a:p>
+          <a:p>
+            <a:endParaRPr lang="en-US" dirty="0"/>
+          </a:p>
+          <a:p>
+            <a:r>
+              <a:rPr lang="en-US" dirty="0"/>
+              <a:t>We segment ECC as well to </a:t>
+            </a:r>
+            <a:r>
+              <a:rPr lang="en-US" b="1" dirty="0"/>
+              <a:t>maintain consistency</a:t>
+            </a:r>
+            <a:endParaRPr lang="en-US" dirty="0"/>
+          </a:p>
+        </p:txBody>
+      </p:sp>
+      <p:sp>
+        <p:nvSpPr>
+          <p:cNvPr id="6" name="Slide Number Placeholder 5">
+            <a:extLst>
+              <a:ext uri="{FF2B5EF4-FFF2-40B4-BE49-F238E27FC236}">
+                <a16:creationId xmlns:a16="http://schemas.microsoft.com/office/drawing/2014/main" id="{705457CF-BE91-26C6-36C6-86CBC2944AA2}"/>
+              </a:ext>
+            </a:extLst>
+          </p:cNvPr>
+          <p:cNvSpPr>
+            <a:spLocks noGrp="1"/>
+          </p:cNvSpPr>
+          <p:nvPr>
+            <p:ph type="sldNum" sz="quarter" idx="12"/>
+          </p:nvPr>
+        </p:nvSpPr>
+        <p:spPr/>
+        <p:txBody>
+          <a:bodyPr/>
+          <a:lstStyle/>
+          <a:p>
+            <a:fld id="{28844951-7827-47D4-8276-7DDE1FA7D85A}" type="slidenum">
+              <a:rPr lang="en-US" smtClean="0"/>
+              <a:t>14</a:t>
+            </a:fld>
+            <a:endParaRPr lang="en-US"/>
+          </a:p>
+        </p:txBody>
+      </p:sp>
+      <p:sp>
+        <p:nvSpPr>
+          <p:cNvPr id="7" name="Title 6">
+            <a:extLst>
+              <a:ext uri="{FF2B5EF4-FFF2-40B4-BE49-F238E27FC236}">
+                <a16:creationId xmlns:a16="http://schemas.microsoft.com/office/drawing/2014/main" id="{B2C836FA-D863-27FA-B41B-E6017461754B}"/>
+              </a:ext>
+            </a:extLst>
+          </p:cNvPr>
+          <p:cNvSpPr>
+            <a:spLocks noGrp="1"/>
+          </p:cNvSpPr>
+          <p:nvPr>
+            <p:ph type="title"/>
+          </p:nvPr>
+        </p:nvSpPr>
+        <p:spPr/>
+        <p:txBody>
+          <a:bodyPr>
+            <a:normAutofit/>
+          </a:bodyPr>
+          <a:lstStyle/>
+          <a:p>
+            <a:r>
+              <a:rPr lang="en-US" dirty="0"/>
+              <a:t>Results</a:t>
+            </a:r>
+          </a:p>
+        </p:txBody>
+      </p:sp>
+      <p:pic>
+        <p:nvPicPr>
+          <p:cNvPr id="10" name="Picture 9">
+            <a:extLst>
+              <a:ext uri="{FF2B5EF4-FFF2-40B4-BE49-F238E27FC236}">
+                <a16:creationId xmlns:a16="http://schemas.microsoft.com/office/drawing/2014/main" id="{45994C0A-399D-C071-6325-1ABAC4EABDCA}"/>
+              </a:ext>
+            </a:extLst>
+          </p:cNvPr>
+          <p:cNvPicPr>
+            <a:picLocks noChangeAspect="1"/>
+          </p:cNvPicPr>
+          <p:nvPr/>
+        </p:nvPicPr>
+        <p:blipFill>
+          <a:blip r:embed="rId2"/>
+          <a:stretch>
+            <a:fillRect/>
+          </a:stretch>
+        </p:blipFill>
+        <p:spPr>
+          <a:xfrm>
+            <a:off x="646882" y="1584008"/>
+            <a:ext cx="6250174" cy="4315596"/>
+          </a:xfrm>
+          <a:prstGeom prst="rect">
+            <a:avLst/>
+          </a:prstGeom>
+        </p:spPr>
+      </p:pic>
+    </p:spTree>
+    <p:extLst>
+      <p:ext uri="{BB962C8B-B14F-4D97-AF65-F5344CB8AC3E}">
+        <p14:creationId xmlns:p14="http://schemas.microsoft.com/office/powerpoint/2010/main" val="12936063"/>
+      </p:ext>
+    </p:extLst>
+  </p:cSld>
+  <p:clrMapOvr>
+    <a:masterClrMapping/>
+  </p:clrMapOvr>
+</p:sld>
+</file>
+
+<file path=ppt/slides/slide15.xml><?xml version="1.0" encoding="utf-8"?>
+<p:sld xmlns:a="http://schemas.openxmlformats.org/drawingml/2006/main" xmlns:r="http://schemas.openxmlformats.org/officeDocument/2006/relationships" xmlns:p="http://schemas.openxmlformats.org/presentationml/2006/main">
+  <p:cSld>
+    <p:spTree>
+      <p:nvGrpSpPr>
+        <p:cNvPr id="1" name="">
+          <a:extLst>
+            <a:ext uri="{FF2B5EF4-FFF2-40B4-BE49-F238E27FC236}">
+              <a16:creationId xmlns:a16="http://schemas.microsoft.com/office/drawing/2014/main" id="{8B6EA702-6651-F319-E9DA-E433A7132B29}"/>
+            </a:ext>
+          </a:extLst>
+        </p:cNvPr>
+        <p:cNvGrpSpPr/>
+        <p:nvPr/>
+      </p:nvGrpSpPr>
+      <p:grpSpPr>
+        <a:xfrm>
+          <a:off x="0" y="0"/>
+          <a:ext cx="0" cy="0"/>
+          <a:chOff x="0" y="0"/>
+          <a:chExt cx="0" cy="0"/>
+        </a:xfrm>
+      </p:grpSpPr>
+      <p:sp>
+        <p:nvSpPr>
+          <p:cNvPr id="2" name="Content Placeholder 1">
+            <a:extLst>
+              <a:ext uri="{FF2B5EF4-FFF2-40B4-BE49-F238E27FC236}">
+                <a16:creationId xmlns:a16="http://schemas.microsoft.com/office/drawing/2014/main" id="{4FB9CA21-7C5F-FD63-C35C-18E7AA59C828}"/>
+              </a:ext>
+            </a:extLst>
+          </p:cNvPr>
+          <p:cNvSpPr>
+            <a:spLocks noGrp="1"/>
+          </p:cNvSpPr>
+          <p:nvPr>
+            <p:ph sz="half" idx="2"/>
+          </p:nvPr>
+        </p:nvSpPr>
+        <p:spPr>
+          <a:xfrm>
+            <a:off x="839788" y="2006600"/>
+            <a:ext cx="10514012" cy="4000183"/>
+          </a:xfrm>
+        </p:spPr>
+        <p:txBody>
+          <a:bodyPr>
+            <a:normAutofit/>
+          </a:bodyPr>
+          <a:lstStyle/>
+          <a:p>
+            <a:r>
+              <a:rPr lang="en-US" dirty="0"/>
+              <a:t>Segmentation </a:t>
+            </a:r>
+            <a:r>
+              <a:rPr lang="en-US" b="1" dirty="0"/>
+              <a:t>minimizes performance impact…</a:t>
+            </a:r>
+            <a:r>
+              <a:rPr lang="en-US" dirty="0"/>
+              <a:t> but also </a:t>
+            </a:r>
+            <a:r>
+              <a:rPr lang="en-US" b="1" dirty="0"/>
+              <a:t>prevents us from taking full advantage</a:t>
+            </a:r>
+          </a:p>
+          <a:p>
+            <a:endParaRPr lang="en-US" dirty="0"/>
+          </a:p>
+          <a:p>
+            <a:r>
+              <a:rPr lang="en-US" dirty="0"/>
+              <a:t>This corroborates </a:t>
+            </a:r>
+            <a:r>
+              <a:rPr lang="en-US" dirty="0" err="1"/>
+              <a:t>Kyber’s</a:t>
+            </a:r>
+            <a:r>
+              <a:rPr lang="en-US" dirty="0"/>
+              <a:t> effectiveness in small systems (</a:t>
+            </a:r>
+            <a:r>
+              <a:rPr lang="en-US" b="1" dirty="0"/>
+              <a:t>due to segmentation</a:t>
+            </a:r>
+            <a:r>
+              <a:rPr lang="en-US" dirty="0"/>
+              <a:t>)</a:t>
+            </a:r>
+          </a:p>
+          <a:p>
+            <a:endParaRPr lang="en-US" dirty="0"/>
+          </a:p>
+          <a:p>
+            <a:r>
+              <a:rPr lang="en-US" dirty="0"/>
+              <a:t>However… this also </a:t>
+            </a:r>
+            <a:r>
+              <a:rPr lang="en-US" b="1" dirty="0"/>
+              <a:t>compromises ability with large payloads</a:t>
+            </a:r>
+            <a:endParaRPr lang="en-US" dirty="0"/>
+          </a:p>
+          <a:p>
+            <a:endParaRPr lang="en-US" b="1" dirty="0"/>
+          </a:p>
+          <a:p>
+            <a:r>
+              <a:rPr lang="en-US" b="1" dirty="0"/>
+              <a:t>Not feasible with large payloads</a:t>
+            </a:r>
+          </a:p>
+          <a:p>
+            <a:endParaRPr lang="en-US" b="1" dirty="0"/>
+          </a:p>
+          <a:p>
+            <a:endParaRPr lang="en-US" dirty="0"/>
+          </a:p>
+        </p:txBody>
+      </p:sp>
+      <p:sp>
+        <p:nvSpPr>
+          <p:cNvPr id="6" name="Slide Number Placeholder 5">
+            <a:extLst>
+              <a:ext uri="{FF2B5EF4-FFF2-40B4-BE49-F238E27FC236}">
+                <a16:creationId xmlns:a16="http://schemas.microsoft.com/office/drawing/2014/main" id="{705457CF-BE91-26C6-36C6-86CBC2944AA2}"/>
+              </a:ext>
+            </a:extLst>
+          </p:cNvPr>
+          <p:cNvSpPr>
+            <a:spLocks noGrp="1"/>
+          </p:cNvSpPr>
+          <p:nvPr>
+            <p:ph type="sldNum" sz="quarter" idx="12"/>
+          </p:nvPr>
+        </p:nvSpPr>
+        <p:spPr/>
+        <p:txBody>
+          <a:bodyPr/>
+          <a:lstStyle/>
+          <a:p>
+            <a:fld id="{28844951-7827-47D4-8276-7DDE1FA7D85A}" type="slidenum">
+              <a:rPr lang="en-US" smtClean="0"/>
+              <a:t>15</a:t>
+            </a:fld>
+            <a:endParaRPr lang="en-US"/>
+          </a:p>
+        </p:txBody>
+      </p:sp>
+      <p:sp>
+        <p:nvSpPr>
+          <p:cNvPr id="7" name="Title 6">
+            <a:extLst>
+              <a:ext uri="{FF2B5EF4-FFF2-40B4-BE49-F238E27FC236}">
+                <a16:creationId xmlns:a16="http://schemas.microsoft.com/office/drawing/2014/main" id="{B2C836FA-D863-27FA-B41B-E6017461754B}"/>
+              </a:ext>
+            </a:extLst>
+          </p:cNvPr>
+          <p:cNvSpPr>
+            <a:spLocks noGrp="1"/>
+          </p:cNvSpPr>
+          <p:nvPr>
+            <p:ph type="title"/>
+          </p:nvPr>
+        </p:nvSpPr>
+        <p:spPr/>
+        <p:txBody>
+          <a:bodyPr>
+            <a:normAutofit/>
+          </a:bodyPr>
+          <a:lstStyle/>
+          <a:p>
+            <a:r>
+              <a:rPr lang="en-US" dirty="0"/>
+              <a:t>Results</a:t>
+            </a:r>
+          </a:p>
+        </p:txBody>
+      </p:sp>
+    </p:spTree>
+    <p:extLst>
+      <p:ext uri="{BB962C8B-B14F-4D97-AF65-F5344CB8AC3E}">
+        <p14:creationId xmlns:p14="http://schemas.microsoft.com/office/powerpoint/2010/main" val="2979928968"/>
+      </p:ext>
+    </p:extLst>
+  </p:cSld>
+  <p:clrMapOvr>
+    <a:masterClrMapping/>
+  </p:clrMapOvr>
+</p:sld>
+</file>
+
+<file path=ppt/slides/slide16.xml><?xml version="1.0" encoding="utf-8"?>
+<p:sld xmlns:a="http://schemas.openxmlformats.org/drawingml/2006/main" xmlns:r="http://schemas.openxmlformats.org/officeDocument/2006/relationships" xmlns:p="http://schemas.openxmlformats.org/presentationml/2006/main">
+  <p:cSld>
+    <p:spTree>
+      <p:nvGrpSpPr>
+        <p:cNvPr id="1" name="">
+          <a:extLst>
+            <a:ext uri="{FF2B5EF4-FFF2-40B4-BE49-F238E27FC236}">
+              <a16:creationId xmlns:a16="http://schemas.microsoft.com/office/drawing/2014/main" id="{8B6EA702-6651-F319-E9DA-E433A7132B29}"/>
+            </a:ext>
+          </a:extLst>
+        </p:cNvPr>
+        <p:cNvGrpSpPr/>
+        <p:nvPr/>
+      </p:nvGrpSpPr>
+      <p:grpSpPr>
+        <a:xfrm>
+          <a:off x="0" y="0"/>
+          <a:ext cx="0" cy="0"/>
+          <a:chOff x="0" y="0"/>
+          <a:chExt cx="0" cy="0"/>
+        </a:xfrm>
+      </p:grpSpPr>
+      <p:sp>
+        <p:nvSpPr>
+          <p:cNvPr id="2" name="Content Placeholder 1">
+            <a:extLst>
+              <a:ext uri="{FF2B5EF4-FFF2-40B4-BE49-F238E27FC236}">
+                <a16:creationId xmlns:a16="http://schemas.microsoft.com/office/drawing/2014/main" id="{4FB9CA21-7C5F-FD63-C35C-18E7AA59C828}"/>
+              </a:ext>
+            </a:extLst>
+          </p:cNvPr>
+          <p:cNvSpPr>
+            <a:spLocks noGrp="1"/>
+          </p:cNvSpPr>
+          <p:nvPr>
+            <p:ph sz="half" idx="2"/>
+          </p:nvPr>
+        </p:nvSpPr>
+        <p:spPr>
+          <a:xfrm>
+            <a:off x="839788" y="2006600"/>
+            <a:ext cx="10514012" cy="4000183"/>
+          </a:xfrm>
+        </p:spPr>
+        <p:txBody>
+          <a:bodyPr>
+            <a:normAutofit/>
+          </a:bodyPr>
+          <a:lstStyle/>
+          <a:p>
+            <a:r>
+              <a:rPr lang="en-US" dirty="0"/>
+              <a:t>Post-quantum cryptography </a:t>
+            </a:r>
+            <a:r>
+              <a:rPr lang="en-US" b="1" dirty="0"/>
+              <a:t>as specified by NIST</a:t>
+            </a:r>
+            <a:r>
+              <a:rPr lang="en-US" dirty="0"/>
+              <a:t> is not feasible with large payloads</a:t>
+            </a:r>
+          </a:p>
+          <a:p>
+            <a:endParaRPr lang="en-US" dirty="0"/>
+          </a:p>
+          <a:p>
+            <a:r>
+              <a:rPr lang="en-US" dirty="0"/>
+              <a:t>We </a:t>
+            </a:r>
+            <a:r>
+              <a:rPr lang="en-US" b="1" dirty="0"/>
+              <a:t>do not </a:t>
+            </a:r>
+            <a:r>
+              <a:rPr lang="en-US" dirty="0"/>
+              <a:t>take advantage of parallelization </a:t>
+            </a:r>
+          </a:p>
+          <a:p>
+            <a:pPr lvl="1"/>
+            <a:r>
+              <a:rPr lang="en-US" dirty="0"/>
+              <a:t>Not part of official specification</a:t>
+            </a:r>
+          </a:p>
+          <a:p>
+            <a:pPr lvl="1"/>
+            <a:r>
+              <a:rPr lang="en-US" dirty="0"/>
+              <a:t>Non-linear and unpredictable increases/decreases to productivity</a:t>
+            </a:r>
+          </a:p>
+          <a:p>
+            <a:pPr lvl="1"/>
+            <a:r>
+              <a:rPr lang="en-US" dirty="0"/>
+              <a:t>Future research direction</a:t>
+            </a:r>
+          </a:p>
+          <a:p>
+            <a:r>
+              <a:rPr lang="en-US" dirty="0"/>
+              <a:t>We </a:t>
+            </a:r>
+            <a:r>
+              <a:rPr lang="en-US" b="1" dirty="0"/>
+              <a:t>do not</a:t>
+            </a:r>
+            <a:r>
+              <a:rPr lang="en-US" dirty="0"/>
+              <a:t> try to </a:t>
+            </a:r>
+            <a:r>
+              <a:rPr lang="en-US" dirty="0" err="1"/>
+              <a:t>desegment</a:t>
+            </a:r>
+            <a:r>
+              <a:rPr lang="en-US" dirty="0"/>
+              <a:t> the algorithm</a:t>
+            </a:r>
+          </a:p>
+          <a:p>
+            <a:pPr lvl="1"/>
+            <a:r>
+              <a:rPr lang="en-US" dirty="0"/>
+              <a:t>Not part of official specification</a:t>
+            </a:r>
+          </a:p>
+          <a:p>
+            <a:pPr lvl="1"/>
+            <a:r>
+              <a:rPr lang="en-US" dirty="0"/>
+              <a:t>Huge ramifications to overall algorithm family</a:t>
+            </a:r>
+          </a:p>
+          <a:p>
+            <a:endParaRPr lang="en-US" b="1" dirty="0"/>
+          </a:p>
+          <a:p>
+            <a:endParaRPr lang="en-US" dirty="0"/>
+          </a:p>
+        </p:txBody>
+      </p:sp>
+      <p:sp>
+        <p:nvSpPr>
+          <p:cNvPr id="6" name="Slide Number Placeholder 5">
+            <a:extLst>
+              <a:ext uri="{FF2B5EF4-FFF2-40B4-BE49-F238E27FC236}">
+                <a16:creationId xmlns:a16="http://schemas.microsoft.com/office/drawing/2014/main" id="{705457CF-BE91-26C6-36C6-86CBC2944AA2}"/>
+              </a:ext>
+            </a:extLst>
+          </p:cNvPr>
+          <p:cNvSpPr>
+            <a:spLocks noGrp="1"/>
+          </p:cNvSpPr>
+          <p:nvPr>
+            <p:ph type="sldNum" sz="quarter" idx="12"/>
+          </p:nvPr>
+        </p:nvSpPr>
+        <p:spPr/>
+        <p:txBody>
+          <a:bodyPr/>
+          <a:lstStyle/>
+          <a:p>
+            <a:fld id="{28844951-7827-47D4-8276-7DDE1FA7D85A}" type="slidenum">
+              <a:rPr lang="en-US" smtClean="0"/>
+              <a:t>16</a:t>
+            </a:fld>
+            <a:endParaRPr lang="en-US"/>
+          </a:p>
+        </p:txBody>
+      </p:sp>
+      <p:sp>
+        <p:nvSpPr>
+          <p:cNvPr id="7" name="Title 6">
+            <a:extLst>
+              <a:ext uri="{FF2B5EF4-FFF2-40B4-BE49-F238E27FC236}">
+                <a16:creationId xmlns:a16="http://schemas.microsoft.com/office/drawing/2014/main" id="{B2C836FA-D863-27FA-B41B-E6017461754B}"/>
+              </a:ext>
+            </a:extLst>
+          </p:cNvPr>
+          <p:cNvSpPr>
+            <a:spLocks noGrp="1"/>
+          </p:cNvSpPr>
+          <p:nvPr>
+            <p:ph type="title"/>
+          </p:nvPr>
+        </p:nvSpPr>
+        <p:spPr/>
+        <p:txBody>
+          <a:bodyPr>
+            <a:normAutofit/>
+          </a:bodyPr>
+          <a:lstStyle/>
+          <a:p>
+            <a:r>
+              <a:rPr lang="en-US" dirty="0"/>
+              <a:t>Conclusions</a:t>
+            </a:r>
+          </a:p>
+        </p:txBody>
+      </p:sp>
+    </p:spTree>
+    <p:extLst>
+      <p:ext uri="{BB962C8B-B14F-4D97-AF65-F5344CB8AC3E}">
+        <p14:creationId xmlns:p14="http://schemas.microsoft.com/office/powerpoint/2010/main" val="1141063342"/>
+      </p:ext>
+    </p:extLst>
+  </p:cSld>
+  <p:clrMapOvr>
+    <a:masterClrMapping/>
+  </p:clrMapOvr>
+</p:sld>
+</file>
+
+<file path=ppt/slides/slide17.xml><?xml version="1.0" encoding="utf-8"?>
+<p:sld xmlns:a="http://schemas.openxmlformats.org/drawingml/2006/main" xmlns:r="http://schemas.openxmlformats.org/officeDocument/2006/relationships" xmlns:p="http://schemas.openxmlformats.org/presentationml/2006/main">
+  <p:cSld>
+    <p:spTree>
+      <p:nvGrpSpPr>
+        <p:cNvPr id="1" name="">
+          <a:extLst>
+            <a:ext uri="{FF2B5EF4-FFF2-40B4-BE49-F238E27FC236}">
+              <a16:creationId xmlns:a16="http://schemas.microsoft.com/office/drawing/2014/main" id="{8B6EA702-6651-F319-E9DA-E433A7132B29}"/>
+            </a:ext>
+          </a:extLst>
+        </p:cNvPr>
+        <p:cNvGrpSpPr/>
+        <p:nvPr/>
+      </p:nvGrpSpPr>
+      <p:grpSpPr>
+        <a:xfrm>
+          <a:off x="0" y="0"/>
+          <a:ext cx="0" cy="0"/>
+          <a:chOff x="0" y="0"/>
+          <a:chExt cx="0" cy="0"/>
+        </a:xfrm>
+      </p:grpSpPr>
+      <p:sp>
+        <p:nvSpPr>
+          <p:cNvPr id="6" name="Slide Number Placeholder 5">
+            <a:extLst>
+              <a:ext uri="{FF2B5EF4-FFF2-40B4-BE49-F238E27FC236}">
+                <a16:creationId xmlns:a16="http://schemas.microsoft.com/office/drawing/2014/main" id="{705457CF-BE91-26C6-36C6-86CBC2944AA2}"/>
+              </a:ext>
+            </a:extLst>
+          </p:cNvPr>
+          <p:cNvSpPr>
+            <a:spLocks noGrp="1"/>
+          </p:cNvSpPr>
+          <p:nvPr>
+            <p:ph type="sldNum" sz="quarter" idx="12"/>
+          </p:nvPr>
+        </p:nvSpPr>
+        <p:spPr/>
+        <p:txBody>
+          <a:bodyPr/>
+          <a:lstStyle/>
+          <a:p>
+            <a:fld id="{28844951-7827-47D4-8276-7DDE1FA7D85A}" type="slidenum">
+              <a:rPr lang="en-US" smtClean="0"/>
+              <a:t>17</a:t>
+            </a:fld>
+            <a:endParaRPr lang="en-US"/>
+          </a:p>
+        </p:txBody>
+      </p:sp>
+      <p:sp>
+        <p:nvSpPr>
+          <p:cNvPr id="7" name="Title 6">
+            <a:extLst>
+              <a:ext uri="{FF2B5EF4-FFF2-40B4-BE49-F238E27FC236}">
+                <a16:creationId xmlns:a16="http://schemas.microsoft.com/office/drawing/2014/main" id="{B2C836FA-D863-27FA-B41B-E6017461754B}"/>
+              </a:ext>
+            </a:extLst>
+          </p:cNvPr>
+          <p:cNvSpPr>
+            <a:spLocks noGrp="1"/>
+          </p:cNvSpPr>
+          <p:nvPr>
+            <p:ph type="title"/>
+          </p:nvPr>
+        </p:nvSpPr>
+        <p:spPr>
+          <a:xfrm>
+            <a:off x="838200" y="556972"/>
+            <a:ext cx="10515600" cy="1325563"/>
+          </a:xfrm>
+        </p:spPr>
+        <p:txBody>
+          <a:bodyPr>
+            <a:normAutofit/>
+          </a:bodyPr>
+          <a:lstStyle/>
+          <a:p>
+            <a:r>
+              <a:rPr lang="en-US" dirty="0"/>
+              <a:t>Works Cited</a:t>
+            </a:r>
+          </a:p>
+        </p:txBody>
+      </p:sp>
+      <p:sp>
+        <p:nvSpPr>
+          <p:cNvPr id="8" name="Content Placeholder 7">
+            <a:extLst>
+              <a:ext uri="{FF2B5EF4-FFF2-40B4-BE49-F238E27FC236}">
+                <a16:creationId xmlns:a16="http://schemas.microsoft.com/office/drawing/2014/main" id="{B63D2C39-E61B-B2E8-2C9C-C04696118DCD}"/>
+              </a:ext>
+            </a:extLst>
+          </p:cNvPr>
+          <p:cNvSpPr>
+            <a:spLocks noGrp="1"/>
+          </p:cNvSpPr>
+          <p:nvPr>
+            <p:ph sz="half" idx="2"/>
+          </p:nvPr>
+        </p:nvSpPr>
+        <p:spPr/>
+        <p:txBody>
+          <a:bodyPr/>
+          <a:lstStyle/>
+          <a:p>
+            <a:endParaRPr lang="en-US"/>
+          </a:p>
+        </p:txBody>
+      </p:sp>
+      <p:pic>
+        <p:nvPicPr>
+          <p:cNvPr id="10" name="Picture 9">
+            <a:extLst>
+              <a:ext uri="{FF2B5EF4-FFF2-40B4-BE49-F238E27FC236}">
+                <a16:creationId xmlns:a16="http://schemas.microsoft.com/office/drawing/2014/main" id="{DD9CAEF2-CF10-27FD-2466-2DDEBE741240}"/>
+              </a:ext>
+            </a:extLst>
+          </p:cNvPr>
+          <p:cNvPicPr>
+            <a:picLocks noChangeAspect="1"/>
+          </p:cNvPicPr>
+          <p:nvPr/>
+        </p:nvPicPr>
+        <p:blipFill>
+          <a:blip r:embed="rId2"/>
+          <a:stretch>
+            <a:fillRect/>
+          </a:stretch>
+        </p:blipFill>
+        <p:spPr>
+          <a:xfrm>
+            <a:off x="838200" y="1650314"/>
+            <a:ext cx="5539625" cy="4622132"/>
+          </a:xfrm>
+          <a:prstGeom prst="rect">
+            <a:avLst/>
+          </a:prstGeom>
+        </p:spPr>
+      </p:pic>
+    </p:spTree>
+    <p:extLst>
+      <p:ext uri="{BB962C8B-B14F-4D97-AF65-F5344CB8AC3E}">
+        <p14:creationId xmlns:p14="http://schemas.microsoft.com/office/powerpoint/2010/main" val="2513194767"/>
+      </p:ext>
+    </p:extLst>
+  </p:cSld>
+  <p:clrMapOvr>
+    <a:masterClrMapping/>
+  </p:clrMapOvr>
+</p:sld>
+</file>
+
 <file path=ppt/slides/slide2.xml><?xml version="1.0" encoding="utf-8"?>
 <p:sld xmlns:a="http://schemas.openxmlformats.org/drawingml/2006/main" xmlns:r="http://schemas.openxmlformats.org/officeDocument/2006/relationships" xmlns:p="http://schemas.openxmlformats.org/presentationml/2006/main">
   <p:cSld>
@@ -8831,7 +10373,7 @@
           <p:cNvPr id="2" name="Title 1">
             <a:extLst>
               <a:ext uri="{FF2B5EF4-FFF2-40B4-BE49-F238E27FC236}">
-                <a16:creationId xmlns:a16="http://schemas.microsoft.com/office/drawing/2014/main" id="{07957686-487A-4245-814E-58B1C25C675C}"/>
+                <a16:creationId xmlns:a16="http://schemas.microsoft.com/office/drawing/2014/main" id="{D78518F4-D13C-40F3-9843-13BBC3B8BDCF}"/>
               </a:ext>
             </a:extLst>
           </p:cNvPr>
@@ -8844,8 +10386,8 @@
         </p:nvSpPr>
         <p:spPr>
           <a:xfrm>
-            <a:off x="838200" y="914399"/>
-            <a:ext cx="5992550" cy="2827422"/>
+            <a:off x="838200" y="681037"/>
+            <a:ext cx="10515600" cy="1325563"/>
           </a:xfrm>
         </p:spPr>
         <p:txBody>
@@ -8854,272 +10396,107 @@
           <a:p>
             <a:r>
               <a:rPr lang="en-US" dirty="0"/>
-              <a:t>Background Information</a:t>
-            </a:r>
-          </a:p>
-        </p:txBody>
-      </p:sp>
-      <p:sp>
-        <p:nvSpPr>
-          <p:cNvPr id="3" name="Content Placeholder 2">
-            <a:extLst>
-              <a:ext uri="{FF2B5EF4-FFF2-40B4-BE49-F238E27FC236}">
-                <a16:creationId xmlns:a16="http://schemas.microsoft.com/office/drawing/2014/main" id="{DB6566BB-9632-4FD7-9FFC-FD3C43D3954E}"/>
-              </a:ext>
-            </a:extLst>
-          </p:cNvPr>
-          <p:cNvSpPr>
-            <a:spLocks noGrp="1"/>
-          </p:cNvSpPr>
-          <p:nvPr>
-            <p:ph idx="1"/>
+              <a:t>Cryptography</a:t>
+            </a:r>
+          </a:p>
+        </p:txBody>
+      </p:sp>
+      <p:sp>
+        <p:nvSpPr>
+          <p:cNvPr id="4" name="Content Placeholder 3">
+            <a:extLst>
+              <a:ext uri="{FF2B5EF4-FFF2-40B4-BE49-F238E27FC236}">
+                <a16:creationId xmlns:a16="http://schemas.microsoft.com/office/drawing/2014/main" id="{FABA94CC-2803-437F-B79F-A5067E28041B}"/>
+              </a:ext>
+            </a:extLst>
+          </p:cNvPr>
+          <p:cNvSpPr>
+            <a:spLocks noGrp="1"/>
+          </p:cNvSpPr>
+          <p:nvPr>
+            <p:ph sz="half" idx="2"/>
           </p:nvPr>
         </p:nvSpPr>
         <p:spPr>
           <a:xfrm>
-            <a:off x="6976085" y="914400"/>
-            <a:ext cx="4377714" cy="2827422"/>
+            <a:off x="839788" y="1944094"/>
+            <a:ext cx="9695690" cy="4062689"/>
           </a:xfrm>
         </p:spPr>
         <p:txBody>
           <a:bodyPr>
-            <a:normAutofit lnSpcReduction="10000"/>
+            <a:normAutofit/>
           </a:bodyPr>
           <a:lstStyle/>
           <a:p>
             <a:r>
               <a:rPr lang="en-US" dirty="0"/>
-              <a:t>Cryptography</a:t>
+              <a:t>Designing and attacking </a:t>
+            </a:r>
+            <a:r>
+              <a:rPr lang="en-US" b="1" dirty="0"/>
+              <a:t>secret codes</a:t>
+            </a:r>
+          </a:p>
+          <a:p>
+            <a:endParaRPr lang="en-US" b="1" dirty="0"/>
+          </a:p>
+          <a:p>
+            <a:r>
+              <a:rPr lang="en-US" dirty="0"/>
+              <a:t>Creating secure channels of communication</a:t>
+            </a:r>
+          </a:p>
+          <a:p>
+            <a:pPr marL="228600" indent="0">
+              <a:buNone/>
+            </a:pPr>
+            <a:endParaRPr lang="en-US" b="1" dirty="0"/>
+          </a:p>
+          <a:p>
+            <a:r>
+              <a:rPr lang="en-US" dirty="0"/>
+              <a:t>Computerized cryptography is primarily based in </a:t>
+            </a:r>
+            <a:r>
+              <a:rPr lang="en-US" b="1" dirty="0"/>
+              <a:t>mathematics</a:t>
+            </a:r>
+          </a:p>
+          <a:p>
+            <a:pPr marL="228600" indent="0">
+              <a:buNone/>
+            </a:pPr>
+            <a:endParaRPr lang="en-US" b="1" dirty="0"/>
+          </a:p>
+          <a:p>
+            <a:r>
+              <a:rPr lang="en-US" dirty="0"/>
+              <a:t>Modern ciphers use </a:t>
+            </a:r>
+            <a:r>
+              <a:rPr lang="en-US" b="1" dirty="0"/>
+              <a:t>hard math problems</a:t>
+            </a:r>
+            <a:r>
+              <a:rPr lang="en-US" dirty="0"/>
+              <a:t> to guarantee security</a:t>
             </a:r>
           </a:p>
           <a:p>
             <a:endParaRPr lang="en-US" dirty="0"/>
           </a:p>
           <a:p>
-            <a:r>
-              <a:rPr lang="en-US" dirty="0"/>
-              <a:t>Quantum Computing</a:t>
-            </a:r>
-          </a:p>
-          <a:p>
             <a:endParaRPr lang="en-US" dirty="0"/>
           </a:p>
-          <a:p>
-            <a:r>
-              <a:rPr lang="en-US" dirty="0"/>
-              <a:t>Performance Metrics</a:t>
-            </a:r>
-          </a:p>
-        </p:txBody>
-      </p:sp>
-      <p:pic>
-        <p:nvPicPr>
-          <p:cNvPr id="9" name="Picture Placeholder 8" descr="Photo of an artist dipping a paint brush in to a paint palette">
-            <a:extLst>
-              <a:ext uri="{FF2B5EF4-FFF2-40B4-BE49-F238E27FC236}">
-                <a16:creationId xmlns:a16="http://schemas.microsoft.com/office/drawing/2014/main" id="{39953FF0-412E-4D4D-91B1-A91C65C46627}"/>
-              </a:ext>
-            </a:extLst>
-          </p:cNvPr>
-          <p:cNvPicPr>
-            <a:picLocks noGrp="1" noChangeAspect="1"/>
-          </p:cNvPicPr>
-          <p:nvPr>
-            <p:ph type="pic" sz="quarter" idx="13"/>
-          </p:nvPr>
-        </p:nvPicPr>
-        <p:blipFill rotWithShape="1">
-          <a:blip r:embed="rId2" cstate="screen">
-            <a:extLst>
-              <a:ext uri="{28A0092B-C50C-407E-A947-70E740481C1C}">
-                <a14:useLocalDpi xmlns:a14="http://schemas.microsoft.com/office/drawing/2010/main" val="0"/>
-              </a:ext>
-            </a:extLst>
-          </a:blip>
-          <a:srcRect/>
-          <a:stretch/>
-        </p:blipFill>
-        <p:spPr>
-          <a:xfrm>
-            <a:off x="490538" y="4059936"/>
-            <a:ext cx="2807208" cy="2322576"/>
-          </a:xfrm>
-        </p:spPr>
-      </p:pic>
-      <p:pic>
-        <p:nvPicPr>
-          <p:cNvPr id="11" name="Picture Placeholder 10" descr="Photo of an artist opening up a tube of paint">
-            <a:extLst>
-              <a:ext uri="{FF2B5EF4-FFF2-40B4-BE49-F238E27FC236}">
-                <a16:creationId xmlns:a16="http://schemas.microsoft.com/office/drawing/2014/main" id="{0CF184A7-72F0-4298-BD0F-B461E6A43557}"/>
-              </a:ext>
-            </a:extLst>
-          </p:cNvPr>
-          <p:cNvPicPr>
-            <a:picLocks noGrp="1" noChangeAspect="1"/>
-          </p:cNvPicPr>
-          <p:nvPr>
-            <p:ph type="pic" sz="quarter" idx="14"/>
-          </p:nvPr>
-        </p:nvPicPr>
-        <p:blipFill rotWithShape="1">
-          <a:blip r:embed="rId3" cstate="screen">
-            <a:extLst>
-              <a:ext uri="{28A0092B-C50C-407E-A947-70E740481C1C}">
-                <a14:useLocalDpi xmlns:a14="http://schemas.microsoft.com/office/drawing/2010/main" val="0"/>
-              </a:ext>
-            </a:extLst>
-          </a:blip>
-          <a:srcRect/>
-          <a:stretch/>
-        </p:blipFill>
-        <p:spPr>
-          <a:xfrm>
-            <a:off x="3291840" y="4059936"/>
-            <a:ext cx="2807208" cy="2322576"/>
-          </a:xfrm>
-        </p:spPr>
-      </p:pic>
-      <p:pic>
-        <p:nvPicPr>
-          <p:cNvPr id="13" name="Picture Placeholder 12" descr="Photo of artist  with a paint brush brushing on orange paint on a palette">
-            <a:extLst>
-              <a:ext uri="{FF2B5EF4-FFF2-40B4-BE49-F238E27FC236}">
-                <a16:creationId xmlns:a16="http://schemas.microsoft.com/office/drawing/2014/main" id="{DB4636A3-BAA9-469C-8F28-2B0A9530D277}"/>
-              </a:ext>
-            </a:extLst>
-          </p:cNvPr>
-          <p:cNvPicPr>
-            <a:picLocks noGrp="1" noChangeAspect="1"/>
-          </p:cNvPicPr>
-          <p:nvPr>
-            <p:ph type="pic" sz="quarter" idx="15"/>
-          </p:nvPr>
-        </p:nvPicPr>
-        <p:blipFill rotWithShape="1">
-          <a:blip r:embed="rId4" cstate="screen">
-            <a:extLst>
-              <a:ext uri="{28A0092B-C50C-407E-A947-70E740481C1C}">
-                <a14:useLocalDpi xmlns:a14="http://schemas.microsoft.com/office/drawing/2010/main" val="0"/>
-              </a:ext>
-            </a:extLst>
-          </a:blip>
-          <a:srcRect/>
-          <a:stretch/>
-        </p:blipFill>
-        <p:spPr>
-          <a:xfrm>
-            <a:off x="6099048" y="4059936"/>
-            <a:ext cx="2807208" cy="2322576"/>
-          </a:xfrm>
-        </p:spPr>
-      </p:pic>
-      <p:pic>
-        <p:nvPicPr>
-          <p:cNvPr id="15" name="Picture Placeholder 14" descr="Photo of a paint brush with blue and white paint">
-            <a:extLst>
-              <a:ext uri="{FF2B5EF4-FFF2-40B4-BE49-F238E27FC236}">
-                <a16:creationId xmlns:a16="http://schemas.microsoft.com/office/drawing/2014/main" id="{AECBB048-D3B9-4FE4-A34B-876DE7D50C84}"/>
-              </a:ext>
-            </a:extLst>
-          </p:cNvPr>
-          <p:cNvPicPr>
-            <a:picLocks noGrp="1" noChangeAspect="1"/>
-          </p:cNvPicPr>
-          <p:nvPr>
-            <p:ph type="pic" sz="quarter" idx="16"/>
-          </p:nvPr>
-        </p:nvPicPr>
-        <p:blipFill rotWithShape="1">
-          <a:blip r:embed="rId5" cstate="screen">
-            <a:extLst>
-              <a:ext uri="{28A0092B-C50C-407E-A947-70E740481C1C}">
-                <a14:useLocalDpi xmlns:a14="http://schemas.microsoft.com/office/drawing/2010/main" val="0"/>
-              </a:ext>
-            </a:extLst>
-          </a:blip>
-          <a:srcRect/>
-          <a:stretch/>
-        </p:blipFill>
-        <p:spPr>
-          <a:xfrm>
-            <a:off x="8906256" y="4059936"/>
-            <a:ext cx="2807208" cy="2322576"/>
-          </a:xfrm>
-        </p:spPr>
-      </p:pic>
-      <p:sp>
-        <p:nvSpPr>
-          <p:cNvPr id="16" name="Date Placeholder 15">
-            <a:extLst>
-              <a:ext uri="{FF2B5EF4-FFF2-40B4-BE49-F238E27FC236}">
-                <a16:creationId xmlns:a16="http://schemas.microsoft.com/office/drawing/2014/main" id="{7FFBE36B-5CC8-44EE-801B-6159157B5328}"/>
-              </a:ext>
-            </a:extLst>
-          </p:cNvPr>
-          <p:cNvSpPr>
-            <a:spLocks noGrp="1"/>
-          </p:cNvSpPr>
-          <p:nvPr>
-            <p:ph type="dt" sz="half" idx="10"/>
-          </p:nvPr>
-        </p:nvSpPr>
-        <p:spPr>
-          <a:xfrm>
-            <a:off x="838200" y="6429375"/>
-            <a:ext cx="2743200" cy="365125"/>
-          </a:xfrm>
-        </p:spPr>
-        <p:txBody>
-          <a:bodyPr/>
-          <a:lstStyle/>
-          <a:p>
-            <a:r>
-              <a:rPr lang="en-US"/>
-              <a:t>3/1/20XX</a:t>
-            </a:r>
-          </a:p>
-        </p:txBody>
-      </p:sp>
-      <p:sp>
-        <p:nvSpPr>
-          <p:cNvPr id="17" name="Footer Placeholder 16">
-            <a:extLst>
-              <a:ext uri="{FF2B5EF4-FFF2-40B4-BE49-F238E27FC236}">
-                <a16:creationId xmlns:a16="http://schemas.microsoft.com/office/drawing/2014/main" id="{FF014D18-B223-4ED4-BCCA-1E4C38285697}"/>
-              </a:ext>
-            </a:extLst>
-          </p:cNvPr>
-          <p:cNvSpPr>
-            <a:spLocks noGrp="1"/>
-          </p:cNvSpPr>
-          <p:nvPr>
-            <p:ph type="ftr" sz="quarter" idx="11"/>
-          </p:nvPr>
-        </p:nvSpPr>
-        <p:spPr>
-          <a:xfrm>
-            <a:off x="4038600" y="6429375"/>
-            <a:ext cx="4114800" cy="365125"/>
-          </a:xfrm>
-        </p:spPr>
-        <p:txBody>
-          <a:bodyPr/>
-          <a:lstStyle/>
-          <a:p>
-            <a:r>
-              <a:rPr lang="en-US"/>
-              <a:t>SAMPLE FOOTER TEXT</a:t>
-            </a:r>
-          </a:p>
-        </p:txBody>
-      </p:sp>
-      <p:sp>
-        <p:nvSpPr>
-          <p:cNvPr id="18" name="Slide Number Placeholder 17">
-            <a:extLst>
-              <a:ext uri="{FF2B5EF4-FFF2-40B4-BE49-F238E27FC236}">
-                <a16:creationId xmlns:a16="http://schemas.microsoft.com/office/drawing/2014/main" id="{41898C30-E58E-4EC9-8A27-DF1822A9863B}"/>
+        </p:txBody>
+      </p:sp>
+      <p:sp>
+        <p:nvSpPr>
+          <p:cNvPr id="9" name="Slide Number Placeholder 8">
+            <a:extLst>
+              <a:ext uri="{FF2B5EF4-FFF2-40B4-BE49-F238E27FC236}">
+                <a16:creationId xmlns:a16="http://schemas.microsoft.com/office/drawing/2014/main" id="{7BD57D52-635E-45A8-AB12-6DAF783169CA}"/>
               </a:ext>
             </a:extLst>
           </p:cNvPr>
@@ -9152,7 +10529,7 @@
     </p:spTree>
     <p:extLst>
       <p:ext uri="{BB962C8B-B14F-4D97-AF65-F5344CB8AC3E}">
-        <p14:creationId xmlns:p14="http://schemas.microsoft.com/office/powerpoint/2010/main" val="2262346778"/>
+        <p14:creationId xmlns:p14="http://schemas.microsoft.com/office/powerpoint/2010/main" val="1448471967"/>
       </p:ext>
     </p:extLst>
   </p:cSld>
@@ -9207,7 +10584,7 @@
           <a:p>
             <a:r>
               <a:rPr lang="en-US" dirty="0"/>
-              <a:t>Cryptography</a:t>
+              <a:t>Hard Math Problems</a:t>
             </a:r>
           </a:p>
         </p:txBody>
@@ -9241,12 +10618,28 @@
           <a:lstStyle/>
           <a:p>
             <a:r>
+              <a:rPr lang="en-US" b="1" dirty="0"/>
+              <a:t>Nearly impossible </a:t>
+            </a:r>
+            <a:r>
               <a:rPr lang="en-US" dirty="0"/>
-              <a:t>Designing and attacking </a:t>
-            </a:r>
+              <a:t>to solve without brute forcing…</a:t>
+            </a:r>
+          </a:p>
+          <a:p>
+            <a:pPr marL="228600" indent="0">
+              <a:buNone/>
+            </a:pPr>
+            <a:endParaRPr lang="en-US" dirty="0"/>
+          </a:p>
+          <a:p>
             <a:r>
               <a:rPr lang="en-US" b="1" dirty="0"/>
-              <a:t>secret codes</a:t>
+              <a:t>UNLESS </a:t>
+            </a:r>
+            <a:r>
+              <a:rPr lang="en-US" dirty="0"/>
+              <a:t>you have the key!</a:t>
             </a:r>
           </a:p>
           <a:p>
@@ -9255,43 +10648,7 @@
           <a:p>
             <a:r>
               <a:rPr lang="en-US" dirty="0"/>
-              <a:t>Creating secure channels of communication</a:t>
-            </a:r>
-          </a:p>
-          <a:p>
-            <a:pPr marL="228600" indent="0">
-              <a:buNone/>
-            </a:pPr>
-            <a:endParaRPr lang="en-US" b="1" dirty="0"/>
-          </a:p>
-          <a:p>
-            <a:r>
-              <a:rPr lang="en-US" dirty="0"/>
-              <a:t>Computerized cryptography is primarily based in </a:t>
-            </a:r>
-            <a:r>
-              <a:rPr lang="en-US" b="1" dirty="0"/>
-              <a:t>mathematics</a:t>
-            </a:r>
-          </a:p>
-          <a:p>
-            <a:pPr marL="228600" indent="0">
-              <a:buNone/>
-            </a:pPr>
-            <a:endParaRPr lang="en-US" b="1" dirty="0"/>
-          </a:p>
-          <a:p>
-            <a:r>
-              <a:rPr lang="en-US" dirty="0"/>
-              <a:t>Modern ciphers use </a:t>
-            </a:r>
-            <a:r>
-              <a:rPr lang="en-US" b="1" dirty="0"/>
-              <a:t>hard math problems</a:t>
-            </a:r>
-            <a:r>
-              <a:rPr lang="en-US" dirty="0"/>
-              <a:t> to guarantee security</a:t>
+              <a:t>Give the key to your partner, and exchange your messages freely</a:t>
             </a:r>
           </a:p>
           <a:p>
@@ -9299,72 +10656,6 @@
           </a:p>
           <a:p>
             <a:endParaRPr lang="en-US" dirty="0"/>
-          </a:p>
-        </p:txBody>
-      </p:sp>
-      <p:sp>
-        <p:nvSpPr>
-          <p:cNvPr id="7" name="Date Placeholder 6">
-            <a:extLst>
-              <a:ext uri="{FF2B5EF4-FFF2-40B4-BE49-F238E27FC236}">
-                <a16:creationId xmlns:a16="http://schemas.microsoft.com/office/drawing/2014/main" id="{A7FD409D-82CA-4A05-9EF1-71EEFF9420DE}"/>
-              </a:ext>
-            </a:extLst>
-          </p:cNvPr>
-          <p:cNvSpPr>
-            <a:spLocks noGrp="1"/>
-          </p:cNvSpPr>
-          <p:nvPr>
-            <p:ph type="dt" sz="half" idx="10"/>
-          </p:nvPr>
-        </p:nvSpPr>
-        <p:spPr>
-          <a:xfrm>
-            <a:off x="838200" y="6429375"/>
-            <a:ext cx="2743200" cy="365125"/>
-          </a:xfrm>
-        </p:spPr>
-        <p:txBody>
-          <a:bodyPr/>
-          <a:lstStyle/>
-          <a:p>
-            <a:r>
-              <a:rPr lang="en-US"/>
-              <a:t>3/1/20XX</a:t>
-            </a:r>
-          </a:p>
-        </p:txBody>
-      </p:sp>
-      <p:sp>
-        <p:nvSpPr>
-          <p:cNvPr id="8" name="Footer Placeholder 7">
-            <a:extLst>
-              <a:ext uri="{FF2B5EF4-FFF2-40B4-BE49-F238E27FC236}">
-                <a16:creationId xmlns:a16="http://schemas.microsoft.com/office/drawing/2014/main" id="{CDD187DA-D1E6-4203-8426-B028CDCA5BAF}"/>
-              </a:ext>
-            </a:extLst>
-          </p:cNvPr>
-          <p:cNvSpPr>
-            <a:spLocks noGrp="1"/>
-          </p:cNvSpPr>
-          <p:nvPr>
-            <p:ph type="ftr" sz="quarter" idx="11"/>
-          </p:nvPr>
-        </p:nvSpPr>
-        <p:spPr>
-          <a:xfrm>
-            <a:off x="4038600" y="6429375"/>
-            <a:ext cx="4114800" cy="365125"/>
-          </a:xfrm>
-        </p:spPr>
-        <p:txBody>
-          <a:bodyPr/>
-          <a:lstStyle/>
-          <a:p>
-            <a:r>
-              <a:rPr lang="en-US"/>
-              <a:t>SAMPLE FOOTER TEXT</a:t>
-            </a:r>
           </a:p>
         </p:txBody>
       </p:sp>
@@ -9406,7 +10697,7 @@
     </p:spTree>
     <p:extLst>
       <p:ext uri="{BB962C8B-B14F-4D97-AF65-F5344CB8AC3E}">
-        <p14:creationId xmlns:p14="http://schemas.microsoft.com/office/powerpoint/2010/main" val="1448471967"/>
+        <p14:creationId xmlns:p14="http://schemas.microsoft.com/office/powerpoint/2010/main" val="1041153474"/>
       </p:ext>
     </p:extLst>
   </p:cSld>
@@ -9496,109 +10787,80 @@
           <a:p>
             <a:r>
               <a:rPr lang="en-US" b="1" dirty="0"/>
-              <a:t>Nearly impossible </a:t>
+              <a:t>Pioneered</a:t>
             </a:r>
             <a:r>
               <a:rPr lang="en-US" dirty="0"/>
-              <a:t>to solve without brute forcing…</a:t>
-            </a:r>
-          </a:p>
-          <a:p>
-            <a:pPr marL="228600" indent="0">
-              <a:buNone/>
-            </a:pPr>
+              <a:t> by RSA – utilizes the </a:t>
+            </a:r>
+            <a:r>
+              <a:rPr lang="en-US" b="1" dirty="0"/>
+              <a:t>prime number factorization</a:t>
+            </a:r>
+            <a:r>
+              <a:rPr lang="en-US" dirty="0"/>
+              <a:t> problem (Schneier)</a:t>
+            </a:r>
+          </a:p>
+          <a:p>
             <a:endParaRPr lang="en-US" dirty="0"/>
           </a:p>
           <a:p>
             <a:r>
+              <a:rPr lang="en-US" dirty="0"/>
+              <a:t>Prime number factorization: how to factor </a:t>
+            </a:r>
+            <a:r>
               <a:rPr lang="en-US" b="1" dirty="0"/>
-              <a:t>UNLESS </a:t>
+              <a:t>very large numbers? </a:t>
             </a:r>
             <a:r>
               <a:rPr lang="en-US" dirty="0"/>
-              <a:t>you have the key!</a:t>
-            </a:r>
-          </a:p>
-          <a:p>
+              <a:t>(Schneier)</a:t>
+            </a:r>
             <a:endParaRPr lang="en-US" b="1" dirty="0"/>
           </a:p>
           <a:p>
+            <a:endParaRPr lang="en-US" b="1" dirty="0"/>
+          </a:p>
+          <a:p>
             <a:r>
               <a:rPr lang="en-US" dirty="0"/>
-              <a:t>Give the key to your partner, and exchange your messages freely</a:t>
-            </a:r>
+              <a:t>Nigh unto impossible without brute force; but </a:t>
+            </a:r>
+            <a:r>
+              <a:rPr lang="en-US" b="1" dirty="0"/>
+              <a:t>easy with a given factor </a:t>
+            </a:r>
+            <a:r>
+              <a:rPr lang="en-US" dirty="0"/>
+              <a:t>(Schneier)</a:t>
+            </a:r>
+            <a:endParaRPr lang="en-US" b="1" dirty="0"/>
+          </a:p>
+          <a:p>
+            <a:endParaRPr lang="en-US" b="1" dirty="0"/>
+          </a:p>
+          <a:p>
+            <a:r>
+              <a:rPr lang="en-US" dirty="0"/>
+              <a:t>Considered </a:t>
+            </a:r>
+            <a:r>
+              <a:rPr lang="en-US" b="1" dirty="0"/>
+              <a:t>intractable </a:t>
+            </a:r>
+            <a:r>
+              <a:rPr lang="en-US" dirty="0"/>
+              <a:t>– theoretically impossible without brute forcing (Schneier)</a:t>
+            </a:r>
+            <a:endParaRPr lang="en-US" b="1" dirty="0"/>
           </a:p>
           <a:p>
             <a:endParaRPr lang="en-US" dirty="0"/>
           </a:p>
           <a:p>
             <a:endParaRPr lang="en-US" dirty="0"/>
-          </a:p>
-        </p:txBody>
-      </p:sp>
-      <p:sp>
-        <p:nvSpPr>
-          <p:cNvPr id="7" name="Date Placeholder 6">
-            <a:extLst>
-              <a:ext uri="{FF2B5EF4-FFF2-40B4-BE49-F238E27FC236}">
-                <a16:creationId xmlns:a16="http://schemas.microsoft.com/office/drawing/2014/main" id="{A7FD409D-82CA-4A05-9EF1-71EEFF9420DE}"/>
-              </a:ext>
-            </a:extLst>
-          </p:cNvPr>
-          <p:cNvSpPr>
-            <a:spLocks noGrp="1"/>
-          </p:cNvSpPr>
-          <p:nvPr>
-            <p:ph type="dt" sz="half" idx="10"/>
-          </p:nvPr>
-        </p:nvSpPr>
-        <p:spPr>
-          <a:xfrm>
-            <a:off x="838200" y="6429375"/>
-            <a:ext cx="2743200" cy="365125"/>
-          </a:xfrm>
-        </p:spPr>
-        <p:txBody>
-          <a:bodyPr/>
-          <a:lstStyle/>
-          <a:p>
-            <a:r>
-              <a:rPr lang="en-US"/>
-              <a:t>3/1/20XX</a:t>
-            </a:r>
-          </a:p>
-        </p:txBody>
-      </p:sp>
-      <p:sp>
-        <p:nvSpPr>
-          <p:cNvPr id="8" name="Footer Placeholder 7">
-            <a:extLst>
-              <a:ext uri="{FF2B5EF4-FFF2-40B4-BE49-F238E27FC236}">
-                <a16:creationId xmlns:a16="http://schemas.microsoft.com/office/drawing/2014/main" id="{CDD187DA-D1E6-4203-8426-B028CDCA5BAF}"/>
-              </a:ext>
-            </a:extLst>
-          </p:cNvPr>
-          <p:cNvSpPr>
-            <a:spLocks noGrp="1"/>
-          </p:cNvSpPr>
-          <p:nvPr>
-            <p:ph type="ftr" sz="quarter" idx="11"/>
-          </p:nvPr>
-        </p:nvSpPr>
-        <p:spPr>
-          <a:xfrm>
-            <a:off x="4038600" y="6429375"/>
-            <a:ext cx="4114800" cy="365125"/>
-          </a:xfrm>
-        </p:spPr>
-        <p:txBody>
-          <a:bodyPr/>
-          <a:lstStyle/>
-          <a:p>
-            <a:r>
-              <a:rPr lang="en-US"/>
-              <a:t>SAMPLE FOOTER TEXT</a:t>
-            </a:r>
           </a:p>
         </p:txBody>
       </p:sp>
@@ -9640,7 +10902,7 @@
     </p:spTree>
     <p:extLst>
       <p:ext uri="{BB962C8B-B14F-4D97-AF65-F5344CB8AC3E}">
-        <p14:creationId xmlns:p14="http://schemas.microsoft.com/office/powerpoint/2010/main" val="1041153474"/>
+        <p14:creationId xmlns:p14="http://schemas.microsoft.com/office/powerpoint/2010/main" val="1631423477"/>
       </p:ext>
     </p:extLst>
   </p:cSld>
@@ -9730,136 +10992,48 @@
           <a:p>
             <a:r>
               <a:rPr lang="en-US" b="1" dirty="0"/>
-              <a:t>Pioneered</a:t>
+              <a:t>Elliptic Curve Cryptography </a:t>
             </a:r>
             <a:r>
               <a:rPr lang="en-US" dirty="0"/>
-              <a:t> by RSA – utilizes the </a:t>
+              <a:t> - a new mathematical problem (Dhillon and Kalra)</a:t>
+            </a:r>
+          </a:p>
+          <a:p>
+            <a:endParaRPr lang="en-US" dirty="0"/>
+          </a:p>
+          <a:p>
+            <a:r>
+              <a:rPr lang="en-US" dirty="0"/>
+              <a:t>Based on the </a:t>
             </a:r>
             <a:r>
               <a:rPr lang="en-US" b="1" dirty="0"/>
-              <a:t>prime number factorization</a:t>
+              <a:t>discrete logarithm</a:t>
             </a:r>
             <a:r>
               <a:rPr lang="en-US" dirty="0"/>
-              <a:t> problem</a:t>
-            </a:r>
+              <a:t> </a:t>
+            </a:r>
+            <a:r>
+              <a:rPr lang="en-US" b="1" dirty="0"/>
+              <a:t>problem: </a:t>
+            </a:r>
+          </a:p>
+          <a:p>
+            <a:endParaRPr lang="en-US" b="1" dirty="0"/>
+          </a:p>
+          <a:p>
+            <a:endParaRPr lang="en-US" b="1" dirty="0"/>
+          </a:p>
+          <a:p>
+            <a:endParaRPr lang="en-US" b="1" dirty="0"/>
           </a:p>
           <a:p>
             <a:endParaRPr lang="en-US" dirty="0"/>
           </a:p>
           <a:p>
-            <a:r>
-              <a:rPr lang="en-US" dirty="0"/>
-              <a:t>Prime number factorization: how to factor </a:t>
-            </a:r>
-            <a:r>
-              <a:rPr lang="en-US" b="1" dirty="0"/>
-              <a:t>very large numbers? </a:t>
-            </a:r>
-          </a:p>
-          <a:p>
-            <a:endParaRPr lang="en-US" b="1" dirty="0"/>
-          </a:p>
-          <a:p>
-            <a:r>
-              <a:rPr lang="en-US" dirty="0"/>
-              <a:t>Nigh unto impossible without brute force; but </a:t>
-            </a:r>
-            <a:r>
-              <a:rPr lang="en-US" b="1" dirty="0"/>
-              <a:t>easy with a given factor</a:t>
-            </a:r>
-          </a:p>
-          <a:p>
-            <a:endParaRPr lang="en-US" b="1" dirty="0"/>
-          </a:p>
-          <a:p>
-            <a:r>
-              <a:rPr lang="en-US" dirty="0"/>
-              <a:t>Considered </a:t>
-            </a:r>
-            <a:r>
-              <a:rPr lang="en-US" b="1" dirty="0"/>
-              <a:t>intractable </a:t>
-            </a:r>
-            <a:r>
-              <a:rPr lang="en-US" dirty="0"/>
-              <a:t>– theoretically impossible without brute forcing</a:t>
-            </a:r>
-            <a:endParaRPr lang="en-US" b="1" dirty="0"/>
-          </a:p>
-          <a:p>
             <a:endParaRPr lang="en-US" dirty="0"/>
-          </a:p>
-          <a:p>
-            <a:endParaRPr lang="en-US" dirty="0"/>
-          </a:p>
-        </p:txBody>
-      </p:sp>
-      <p:sp>
-        <p:nvSpPr>
-          <p:cNvPr id="7" name="Date Placeholder 6">
-            <a:extLst>
-              <a:ext uri="{FF2B5EF4-FFF2-40B4-BE49-F238E27FC236}">
-                <a16:creationId xmlns:a16="http://schemas.microsoft.com/office/drawing/2014/main" id="{A7FD409D-82CA-4A05-9EF1-71EEFF9420DE}"/>
-              </a:ext>
-            </a:extLst>
-          </p:cNvPr>
-          <p:cNvSpPr>
-            <a:spLocks noGrp="1"/>
-          </p:cNvSpPr>
-          <p:nvPr>
-            <p:ph type="dt" sz="half" idx="10"/>
-          </p:nvPr>
-        </p:nvSpPr>
-        <p:spPr>
-          <a:xfrm>
-            <a:off x="838200" y="6429375"/>
-            <a:ext cx="2743200" cy="365125"/>
-          </a:xfrm>
-        </p:spPr>
-        <p:txBody>
-          <a:bodyPr/>
-          <a:lstStyle/>
-          <a:p>
-            <a:r>
-              <a:rPr lang="en-US" dirty="0"/>
-              <a:t>3/1/20XX</a:t>
-            </a:r>
-          </a:p>
-        </p:txBody>
-      </p:sp>
-      <p:sp>
-        <p:nvSpPr>
-          <p:cNvPr id="8" name="Footer Placeholder 7">
-            <a:extLst>
-              <a:ext uri="{FF2B5EF4-FFF2-40B4-BE49-F238E27FC236}">
-                <a16:creationId xmlns:a16="http://schemas.microsoft.com/office/drawing/2014/main" id="{CDD187DA-D1E6-4203-8426-B028CDCA5BAF}"/>
-              </a:ext>
-            </a:extLst>
-          </p:cNvPr>
-          <p:cNvSpPr>
-            <a:spLocks noGrp="1"/>
-          </p:cNvSpPr>
-          <p:nvPr>
-            <p:ph type="ftr" sz="quarter" idx="11"/>
-          </p:nvPr>
-        </p:nvSpPr>
-        <p:spPr>
-          <a:xfrm>
-            <a:off x="4038600" y="6429375"/>
-            <a:ext cx="4114800" cy="365125"/>
-          </a:xfrm>
-        </p:spPr>
-        <p:txBody>
-          <a:bodyPr/>
-          <a:lstStyle/>
-          <a:p>
-            <a:r>
-              <a:rPr lang="en-US"/>
-              <a:t>SAMPLE FOOTER TEXT</a:t>
-            </a:r>
           </a:p>
         </p:txBody>
       </p:sp>
@@ -9893,245 +11067,6 @@
               <a:rPr lang="en-US" smtClean="0"/>
               <a:pPr/>
               <a:t>5</a:t>
-            </a:fld>
-            <a:endParaRPr lang="en-US"/>
-          </a:p>
-        </p:txBody>
-      </p:sp>
-    </p:spTree>
-    <p:extLst>
-      <p:ext uri="{BB962C8B-B14F-4D97-AF65-F5344CB8AC3E}">
-        <p14:creationId xmlns:p14="http://schemas.microsoft.com/office/powerpoint/2010/main" val="1631423477"/>
-      </p:ext>
-    </p:extLst>
-  </p:cSld>
-  <p:clrMapOvr>
-    <a:masterClrMapping/>
-  </p:clrMapOvr>
-</p:sld>
-</file>
-
-<file path=ppt/slides/slide6.xml><?xml version="1.0" encoding="utf-8"?>
-<p:sld xmlns:a="http://schemas.openxmlformats.org/drawingml/2006/main" xmlns:r="http://schemas.openxmlformats.org/officeDocument/2006/relationships" xmlns:p="http://schemas.openxmlformats.org/presentationml/2006/main">
-  <p:cSld>
-    <p:spTree>
-      <p:nvGrpSpPr>
-        <p:cNvPr id="1" name=""/>
-        <p:cNvGrpSpPr/>
-        <p:nvPr/>
-      </p:nvGrpSpPr>
-      <p:grpSpPr>
-        <a:xfrm>
-          <a:off x="0" y="0"/>
-          <a:ext cx="0" cy="0"/>
-          <a:chOff x="0" y="0"/>
-          <a:chExt cx="0" cy="0"/>
-        </a:xfrm>
-      </p:grpSpPr>
-      <p:sp>
-        <p:nvSpPr>
-          <p:cNvPr id="2" name="Title 1">
-            <a:extLst>
-              <a:ext uri="{FF2B5EF4-FFF2-40B4-BE49-F238E27FC236}">
-                <a16:creationId xmlns:a16="http://schemas.microsoft.com/office/drawing/2014/main" id="{D78518F4-D13C-40F3-9843-13BBC3B8BDCF}"/>
-              </a:ext>
-            </a:extLst>
-          </p:cNvPr>
-          <p:cNvSpPr>
-            <a:spLocks noGrp="1"/>
-          </p:cNvSpPr>
-          <p:nvPr>
-            <p:ph type="title"/>
-          </p:nvPr>
-        </p:nvSpPr>
-        <p:spPr>
-          <a:xfrm>
-            <a:off x="838200" y="681037"/>
-            <a:ext cx="10515600" cy="1325563"/>
-          </a:xfrm>
-        </p:spPr>
-        <p:txBody>
-          <a:bodyPr/>
-          <a:lstStyle/>
-          <a:p>
-            <a:r>
-              <a:rPr lang="en-US" dirty="0"/>
-              <a:t>Hard Math Problems</a:t>
-            </a:r>
-          </a:p>
-        </p:txBody>
-      </p:sp>
-      <p:sp>
-        <p:nvSpPr>
-          <p:cNvPr id="4" name="Content Placeholder 3">
-            <a:extLst>
-              <a:ext uri="{FF2B5EF4-FFF2-40B4-BE49-F238E27FC236}">
-                <a16:creationId xmlns:a16="http://schemas.microsoft.com/office/drawing/2014/main" id="{FABA94CC-2803-437F-B79F-A5067E28041B}"/>
-              </a:ext>
-            </a:extLst>
-          </p:cNvPr>
-          <p:cNvSpPr>
-            <a:spLocks noGrp="1"/>
-          </p:cNvSpPr>
-          <p:nvPr>
-            <p:ph sz="half" idx="2"/>
-          </p:nvPr>
-        </p:nvSpPr>
-        <p:spPr>
-          <a:xfrm>
-            <a:off x="839788" y="1944094"/>
-            <a:ext cx="9695690" cy="4062689"/>
-          </a:xfrm>
-        </p:spPr>
-        <p:txBody>
-          <a:bodyPr>
-            <a:normAutofit/>
-          </a:bodyPr>
-          <a:lstStyle/>
-          <a:p>
-            <a:r>
-              <a:rPr lang="en-US" b="1" dirty="0"/>
-              <a:t>Elliptic Curve Cryptography </a:t>
-            </a:r>
-            <a:r>
-              <a:rPr lang="en-US" dirty="0"/>
-              <a:t> - a new mathematical problem</a:t>
-            </a:r>
-          </a:p>
-          <a:p>
-            <a:endParaRPr lang="en-US" dirty="0"/>
-          </a:p>
-          <a:p>
-            <a:r>
-              <a:rPr lang="en-US" dirty="0"/>
-              <a:t>Based on the </a:t>
-            </a:r>
-            <a:r>
-              <a:rPr lang="en-US" b="1" dirty="0"/>
-              <a:t>discrete logarithm</a:t>
-            </a:r>
-            <a:r>
-              <a:rPr lang="en-US" dirty="0"/>
-              <a:t> </a:t>
-            </a:r>
-            <a:r>
-              <a:rPr lang="en-US" b="1" dirty="0"/>
-              <a:t>problem: </a:t>
-            </a:r>
-          </a:p>
-          <a:p>
-            <a:endParaRPr lang="en-US" b="1" dirty="0"/>
-          </a:p>
-          <a:p>
-            <a:endParaRPr lang="en-US" b="1" dirty="0"/>
-          </a:p>
-          <a:p>
-            <a:endParaRPr lang="en-US" b="1" dirty="0"/>
-          </a:p>
-          <a:p>
-            <a:endParaRPr lang="en-US" dirty="0"/>
-          </a:p>
-          <a:p>
-            <a:endParaRPr lang="en-US" dirty="0"/>
-          </a:p>
-        </p:txBody>
-      </p:sp>
-      <p:sp>
-        <p:nvSpPr>
-          <p:cNvPr id="7" name="Date Placeholder 6">
-            <a:extLst>
-              <a:ext uri="{FF2B5EF4-FFF2-40B4-BE49-F238E27FC236}">
-                <a16:creationId xmlns:a16="http://schemas.microsoft.com/office/drawing/2014/main" id="{A7FD409D-82CA-4A05-9EF1-71EEFF9420DE}"/>
-              </a:ext>
-            </a:extLst>
-          </p:cNvPr>
-          <p:cNvSpPr>
-            <a:spLocks noGrp="1"/>
-          </p:cNvSpPr>
-          <p:nvPr>
-            <p:ph type="dt" sz="half" idx="10"/>
-          </p:nvPr>
-        </p:nvSpPr>
-        <p:spPr>
-          <a:xfrm>
-            <a:off x="838200" y="6429375"/>
-            <a:ext cx="2743200" cy="365125"/>
-          </a:xfrm>
-        </p:spPr>
-        <p:txBody>
-          <a:bodyPr/>
-          <a:lstStyle/>
-          <a:p>
-            <a:r>
-              <a:rPr lang="en-US" dirty="0"/>
-              <a:t>3/1/20XX</a:t>
-            </a:r>
-          </a:p>
-        </p:txBody>
-      </p:sp>
-      <p:sp>
-        <p:nvSpPr>
-          <p:cNvPr id="8" name="Footer Placeholder 7">
-            <a:extLst>
-              <a:ext uri="{FF2B5EF4-FFF2-40B4-BE49-F238E27FC236}">
-                <a16:creationId xmlns:a16="http://schemas.microsoft.com/office/drawing/2014/main" id="{CDD187DA-D1E6-4203-8426-B028CDCA5BAF}"/>
-              </a:ext>
-            </a:extLst>
-          </p:cNvPr>
-          <p:cNvSpPr>
-            <a:spLocks noGrp="1"/>
-          </p:cNvSpPr>
-          <p:nvPr>
-            <p:ph type="ftr" sz="quarter" idx="11"/>
-          </p:nvPr>
-        </p:nvSpPr>
-        <p:spPr>
-          <a:xfrm>
-            <a:off x="4038600" y="6429375"/>
-            <a:ext cx="4114800" cy="365125"/>
-          </a:xfrm>
-        </p:spPr>
-        <p:txBody>
-          <a:bodyPr/>
-          <a:lstStyle/>
-          <a:p>
-            <a:r>
-              <a:rPr lang="en-US"/>
-              <a:t>SAMPLE FOOTER TEXT</a:t>
-            </a:r>
-          </a:p>
-        </p:txBody>
-      </p:sp>
-      <p:sp>
-        <p:nvSpPr>
-          <p:cNvPr id="9" name="Slide Number Placeholder 8">
-            <a:extLst>
-              <a:ext uri="{FF2B5EF4-FFF2-40B4-BE49-F238E27FC236}">
-                <a16:creationId xmlns:a16="http://schemas.microsoft.com/office/drawing/2014/main" id="{7BD57D52-635E-45A8-AB12-6DAF783169CA}"/>
-              </a:ext>
-            </a:extLst>
-          </p:cNvPr>
-          <p:cNvSpPr>
-            <a:spLocks noGrp="1"/>
-          </p:cNvSpPr>
-          <p:nvPr>
-            <p:ph type="sldNum" sz="quarter" idx="12"/>
-          </p:nvPr>
-        </p:nvSpPr>
-        <p:spPr>
-          <a:xfrm>
-            <a:off x="8610600" y="6429375"/>
-            <a:ext cx="2743200" cy="365125"/>
-          </a:xfrm>
-        </p:spPr>
-        <p:txBody>
-          <a:bodyPr/>
-          <a:lstStyle/>
-          <a:p>
-            <a:fld id="{28844951-7827-47D4-8276-7DDE1FA7D85A}" type="slidenum">
-              <a:rPr lang="en-US" smtClean="0"/>
-              <a:pPr/>
-              <a:t>6</a:t>
             </a:fld>
             <a:endParaRPr lang="en-US"/>
           </a:p>
@@ -10180,6 +11115,279 @@
 </p:sld>
 </file>
 
+<file path=ppt/slides/slide6.xml><?xml version="1.0" encoding="utf-8"?>
+<p:sld xmlns:a="http://schemas.openxmlformats.org/drawingml/2006/main" xmlns:r="http://schemas.openxmlformats.org/officeDocument/2006/relationships" xmlns:p="http://schemas.openxmlformats.org/presentationml/2006/main">
+  <p:cSld>
+    <p:spTree>
+      <p:nvGrpSpPr>
+        <p:cNvPr id="1" name=""/>
+        <p:cNvGrpSpPr/>
+        <p:nvPr/>
+      </p:nvGrpSpPr>
+      <p:grpSpPr>
+        <a:xfrm>
+          <a:off x="0" y="0"/>
+          <a:ext cx="0" cy="0"/>
+          <a:chOff x="0" y="0"/>
+          <a:chExt cx="0" cy="0"/>
+        </a:xfrm>
+      </p:grpSpPr>
+      <p:sp>
+        <p:nvSpPr>
+          <p:cNvPr id="2" name="Content Placeholder 1">
+            <a:extLst>
+              <a:ext uri="{FF2B5EF4-FFF2-40B4-BE49-F238E27FC236}">
+                <a16:creationId xmlns:a16="http://schemas.microsoft.com/office/drawing/2014/main" id="{1BB016D6-FB0D-B212-9041-7247FF3C362F}"/>
+              </a:ext>
+            </a:extLst>
+          </p:cNvPr>
+          <p:cNvSpPr>
+            <a:spLocks noGrp="1"/>
+          </p:cNvSpPr>
+          <p:nvPr>
+            <p:ph sz="half" idx="2"/>
+          </p:nvPr>
+        </p:nvSpPr>
+        <p:spPr/>
+        <p:txBody>
+          <a:bodyPr/>
+          <a:lstStyle/>
+          <a:p>
+            <a:r>
+              <a:rPr lang="en-US" b="1" dirty="0"/>
+              <a:t>The standard</a:t>
+            </a:r>
+            <a:r>
+              <a:rPr lang="en-US" dirty="0"/>
+              <a:t> – nearly all computers in the world</a:t>
+            </a:r>
+          </a:p>
+          <a:p>
+            <a:r>
+              <a:rPr lang="en-US" b="1" dirty="0"/>
+              <a:t>Bits </a:t>
+            </a:r>
+            <a:r>
+              <a:rPr lang="en-US" dirty="0"/>
+              <a:t>(0s and 1s) to store data</a:t>
+            </a:r>
+          </a:p>
+          <a:p>
+            <a:r>
+              <a:rPr lang="en-US" dirty="0"/>
+              <a:t>Makes calculations </a:t>
+            </a:r>
+            <a:r>
+              <a:rPr lang="en-US" b="1" dirty="0"/>
+              <a:t>individually</a:t>
+            </a:r>
+          </a:p>
+          <a:p>
+            <a:pPr lvl="1"/>
+            <a:r>
+              <a:rPr lang="en-US" dirty="0"/>
+              <a:t>(in a theoretical manner)</a:t>
+            </a:r>
+          </a:p>
+          <a:p>
+            <a:r>
+              <a:rPr lang="en-US" b="1" dirty="0"/>
+              <a:t>Precise and thorough</a:t>
+            </a:r>
+          </a:p>
+        </p:txBody>
+      </p:sp>
+      <p:sp>
+        <p:nvSpPr>
+          <p:cNvPr id="3" name="Content Placeholder 2">
+            <a:extLst>
+              <a:ext uri="{FF2B5EF4-FFF2-40B4-BE49-F238E27FC236}">
+                <a16:creationId xmlns:a16="http://schemas.microsoft.com/office/drawing/2014/main" id="{9003A7AE-E397-49F6-21BD-1B560B889856}"/>
+              </a:ext>
+            </a:extLst>
+          </p:cNvPr>
+          <p:cNvSpPr>
+            <a:spLocks noGrp="1"/>
+          </p:cNvSpPr>
+          <p:nvPr>
+            <p:ph sz="quarter" idx="4"/>
+          </p:nvPr>
+        </p:nvSpPr>
+        <p:spPr/>
+        <p:txBody>
+          <a:bodyPr/>
+          <a:lstStyle/>
+          <a:p>
+            <a:r>
+              <a:rPr lang="en-US" b="1" dirty="0"/>
+              <a:t>New</a:t>
+            </a:r>
+            <a:r>
+              <a:rPr lang="en-US" dirty="0"/>
+              <a:t> – very few concrete use cases for quantum computing</a:t>
+            </a:r>
+          </a:p>
+          <a:p>
+            <a:r>
+              <a:rPr lang="en-US" b="1" dirty="0"/>
+              <a:t>Qubits</a:t>
+            </a:r>
+            <a:r>
+              <a:rPr lang="en-US" dirty="0"/>
+              <a:t> – a superposition between 0 and 1</a:t>
+            </a:r>
+          </a:p>
+          <a:p>
+            <a:r>
+              <a:rPr lang="en-US" dirty="0"/>
+              <a:t>May do </a:t>
+            </a:r>
+            <a:r>
+              <a:rPr lang="en-US" b="1" dirty="0"/>
+              <a:t>many calculations at once</a:t>
+            </a:r>
+          </a:p>
+          <a:p>
+            <a:pPr lvl="1"/>
+            <a:r>
+              <a:rPr lang="en-US" dirty="0"/>
+              <a:t>(in a theoretical manner)</a:t>
+            </a:r>
+          </a:p>
+          <a:p>
+            <a:r>
+              <a:rPr lang="en-US" b="1" dirty="0"/>
+              <a:t>Imprecise and Noisy</a:t>
+            </a:r>
+          </a:p>
+        </p:txBody>
+      </p:sp>
+      <p:sp>
+        <p:nvSpPr>
+          <p:cNvPr id="6" name="Slide Number Placeholder 5">
+            <a:extLst>
+              <a:ext uri="{FF2B5EF4-FFF2-40B4-BE49-F238E27FC236}">
+                <a16:creationId xmlns:a16="http://schemas.microsoft.com/office/drawing/2014/main" id="{722A2190-2749-C128-5DA7-929D31EFB9A1}"/>
+              </a:ext>
+            </a:extLst>
+          </p:cNvPr>
+          <p:cNvSpPr>
+            <a:spLocks noGrp="1"/>
+          </p:cNvSpPr>
+          <p:nvPr>
+            <p:ph type="sldNum" sz="quarter" idx="12"/>
+          </p:nvPr>
+        </p:nvSpPr>
+        <p:spPr/>
+        <p:txBody>
+          <a:bodyPr/>
+          <a:lstStyle/>
+          <a:p>
+            <a:fld id="{28844951-7827-47D4-8276-7DDE1FA7D85A}" type="slidenum">
+              <a:rPr lang="en-US" smtClean="0"/>
+              <a:t>6</a:t>
+            </a:fld>
+            <a:endParaRPr lang="en-US"/>
+          </a:p>
+        </p:txBody>
+      </p:sp>
+      <p:sp>
+        <p:nvSpPr>
+          <p:cNvPr id="7" name="Title 6">
+            <a:extLst>
+              <a:ext uri="{FF2B5EF4-FFF2-40B4-BE49-F238E27FC236}">
+                <a16:creationId xmlns:a16="http://schemas.microsoft.com/office/drawing/2014/main" id="{03E960F7-DDB1-3097-6DD7-69A6CFBC5B8F}"/>
+              </a:ext>
+            </a:extLst>
+          </p:cNvPr>
+          <p:cNvSpPr>
+            <a:spLocks noGrp="1"/>
+          </p:cNvSpPr>
+          <p:nvPr>
+            <p:ph type="title"/>
+          </p:nvPr>
+        </p:nvSpPr>
+        <p:spPr/>
+        <p:txBody>
+          <a:bodyPr/>
+          <a:lstStyle/>
+          <a:p>
+            <a:r>
+              <a:rPr lang="en-US" dirty="0"/>
+              <a:t>Models of Computation</a:t>
+            </a:r>
+          </a:p>
+        </p:txBody>
+      </p:sp>
+      <p:sp>
+        <p:nvSpPr>
+          <p:cNvPr id="8" name="Text Placeholder 7">
+            <a:extLst>
+              <a:ext uri="{FF2B5EF4-FFF2-40B4-BE49-F238E27FC236}">
+                <a16:creationId xmlns:a16="http://schemas.microsoft.com/office/drawing/2014/main" id="{1F7AA011-7A78-0883-6C6C-89F42BAA0D87}"/>
+              </a:ext>
+            </a:extLst>
+          </p:cNvPr>
+          <p:cNvSpPr>
+            <a:spLocks noGrp="1"/>
+          </p:cNvSpPr>
+          <p:nvPr>
+            <p:ph type="body" idx="1"/>
+          </p:nvPr>
+        </p:nvSpPr>
+        <p:spPr/>
+        <p:txBody>
+          <a:bodyPr/>
+          <a:lstStyle/>
+          <a:p>
+            <a:r>
+              <a:rPr lang="en-US" dirty="0"/>
+              <a:t>Classical	</a:t>
+            </a:r>
+          </a:p>
+        </p:txBody>
+      </p:sp>
+      <p:sp>
+        <p:nvSpPr>
+          <p:cNvPr id="9" name="Text Placeholder 8">
+            <a:extLst>
+              <a:ext uri="{FF2B5EF4-FFF2-40B4-BE49-F238E27FC236}">
+                <a16:creationId xmlns:a16="http://schemas.microsoft.com/office/drawing/2014/main" id="{D4E57944-992C-AEAD-CEA6-6A7356BE405A}"/>
+              </a:ext>
+            </a:extLst>
+          </p:cNvPr>
+          <p:cNvSpPr>
+            <a:spLocks noGrp="1"/>
+          </p:cNvSpPr>
+          <p:nvPr>
+            <p:ph type="body" sz="quarter" idx="13"/>
+          </p:nvPr>
+        </p:nvSpPr>
+        <p:spPr/>
+        <p:txBody>
+          <a:bodyPr/>
+          <a:lstStyle/>
+          <a:p>
+            <a:r>
+              <a:rPr lang="en-US" dirty="0"/>
+              <a:t>Quantum</a:t>
+            </a:r>
+          </a:p>
+        </p:txBody>
+      </p:sp>
+    </p:spTree>
+    <p:extLst>
+      <p:ext uri="{BB962C8B-B14F-4D97-AF65-F5344CB8AC3E}">
+        <p14:creationId xmlns:p14="http://schemas.microsoft.com/office/powerpoint/2010/main" val="2968149438"/>
+      </p:ext>
+    </p:extLst>
+  </p:cSld>
+  <p:clrMapOvr>
+    <a:masterClrMapping/>
+  </p:clrMapOvr>
+</p:sld>
+</file>
+
 <file path=ppt/slides/slide7.xml><?xml version="1.0" encoding="utf-8"?>
 <p:sld xmlns:a="http://schemas.openxmlformats.org/drawingml/2006/main" xmlns:r="http://schemas.openxmlformats.org/officeDocument/2006/relationships" xmlns:p="http://schemas.openxmlformats.org/presentationml/2006/main">
   <p:cSld>
@@ -10202,7 +11410,7 @@
           <p:cNvPr id="2" name="Content Placeholder 1">
             <a:extLst>
               <a:ext uri="{FF2B5EF4-FFF2-40B4-BE49-F238E27FC236}">
-                <a16:creationId xmlns:a16="http://schemas.microsoft.com/office/drawing/2014/main" id="{1BB016D6-FB0D-B212-9041-7247FF3C362F}"/>
+                <a16:creationId xmlns:a16="http://schemas.microsoft.com/office/drawing/2014/main" id="{1E4DC75C-6477-4B8A-8EE6-4FF58D8F3DD5}"/>
               </a:ext>
             </a:extLst>
           </p:cNvPr>
@@ -10213,172 +11421,74 @@
             <p:ph sz="half" idx="2"/>
           </p:nvPr>
         </p:nvSpPr>
-        <p:spPr/>
+        <p:spPr>
+          <a:xfrm>
+            <a:off x="839788" y="2006600"/>
+            <a:ext cx="10514012" cy="4000183"/>
+          </a:xfrm>
+        </p:spPr>
         <p:txBody>
           <a:bodyPr/>
           <a:lstStyle/>
           <a:p>
             <a:r>
+              <a:rPr lang="en-US" dirty="0"/>
+              <a:t>There is currently a </a:t>
+            </a:r>
+            <a:r>
               <a:rPr lang="en-US" b="1" dirty="0"/>
-              <a:t>The standard</a:t>
+              <a:t>single</a:t>
             </a:r>
             <a:r>
               <a:rPr lang="en-US" dirty="0"/>
-              <a:t> – nearly all computers in the world</a:t>
-            </a:r>
+              <a:t> concrete use case for quantum computers </a:t>
+            </a:r>
+          </a:p>
+          <a:p>
+            <a:endParaRPr lang="en-US" dirty="0"/>
           </a:p>
           <a:p>
             <a:r>
               <a:rPr lang="en-US" b="1" dirty="0"/>
-              <a:t>Bits </a:t>
+              <a:t>Shor’s Algorithm</a:t>
             </a:r>
             <a:r>
               <a:rPr lang="en-US" dirty="0"/>
-              <a:t>(0s and 1s) to store data</a:t>
-            </a:r>
-          </a:p>
-          <a:p>
+              <a:t> – can solve </a:t>
+            </a:r>
+            <a:r>
+              <a:rPr lang="en-US" b="1" dirty="0"/>
+              <a:t>BOTH</a:t>
+            </a:r>
             <a:r>
               <a:rPr lang="en-US" dirty="0"/>
-              <a:t>Makes calculations </a:t>
+              <a:t> the prime factorization problem and discrete logarithm problem (Shor)</a:t>
+            </a:r>
+          </a:p>
+          <a:p>
+            <a:endParaRPr lang="en-US" b="1" dirty="0"/>
+          </a:p>
+          <a:p>
+            <a:r>
+              <a:rPr lang="en-US" dirty="0"/>
+              <a:t>Reduce intractable problems to the </a:t>
             </a:r>
             <a:r>
               <a:rPr lang="en-US" b="1" dirty="0"/>
-              <a:t>individually</a:t>
-            </a:r>
-          </a:p>
-          <a:p>
-            <a:pPr lvl="1"/>
+              <a:t>order finding problem</a:t>
+            </a:r>
             <a:r>
               <a:rPr lang="en-US" dirty="0"/>
-              <a:t>(in a theoretical manner)</a:t>
-            </a:r>
+              <a:t>; then, solve with order-finding problem (Shor)</a:t>
+            </a:r>
+          </a:p>
+          <a:p>
+            <a:endParaRPr lang="en-US" dirty="0"/>
           </a:p>
           <a:p>
             <a:r>
               <a:rPr lang="en-US" b="1" dirty="0"/>
-              <a:t>Precise and thorough</a:t>
-            </a:r>
-          </a:p>
-        </p:txBody>
-      </p:sp>
-      <p:sp>
-        <p:nvSpPr>
-          <p:cNvPr id="3" name="Content Placeholder 2">
-            <a:extLst>
-              <a:ext uri="{FF2B5EF4-FFF2-40B4-BE49-F238E27FC236}">
-                <a16:creationId xmlns:a16="http://schemas.microsoft.com/office/drawing/2014/main" id="{9003A7AE-E397-49F6-21BD-1B560B889856}"/>
-              </a:ext>
-            </a:extLst>
-          </p:cNvPr>
-          <p:cNvSpPr>
-            <a:spLocks noGrp="1"/>
-          </p:cNvSpPr>
-          <p:nvPr>
-            <p:ph sz="quarter" idx="4"/>
-          </p:nvPr>
-        </p:nvSpPr>
-        <p:spPr/>
-        <p:txBody>
-          <a:bodyPr/>
-          <a:lstStyle/>
-          <a:p>
-            <a:r>
-              <a:rPr lang="en-US" b="1" dirty="0"/>
-              <a:t>New</a:t>
-            </a:r>
-            <a:r>
-              <a:rPr lang="en-US" dirty="0"/>
-              <a:t> – very few concrete use cases for quantum computing</a:t>
-            </a:r>
-          </a:p>
-          <a:p>
-            <a:r>
-              <a:rPr lang="en-US" b="1" dirty="0"/>
-              <a:t>Qubits</a:t>
-            </a:r>
-            <a:r>
-              <a:rPr lang="en-US" dirty="0"/>
-              <a:t> – a superposition between 0 and 1</a:t>
-            </a:r>
-          </a:p>
-          <a:p>
-            <a:r>
-              <a:rPr lang="en-US" dirty="0"/>
-              <a:t>May do </a:t>
-            </a:r>
-            <a:r>
-              <a:rPr lang="en-US" b="1" dirty="0"/>
-              <a:t>many calculations at once</a:t>
-            </a:r>
-          </a:p>
-          <a:p>
-            <a:pPr lvl="1"/>
-            <a:r>
-              <a:rPr lang="en-US" dirty="0"/>
-              <a:t>(in a theoretical manner)</a:t>
-            </a:r>
-          </a:p>
-          <a:p>
-            <a:r>
-              <a:rPr lang="en-US" b="1" dirty="0"/>
-              <a:t>Imprecise and Noisy</a:t>
-            </a:r>
-          </a:p>
-        </p:txBody>
-      </p:sp>
-      <p:sp>
-        <p:nvSpPr>
-          <p:cNvPr id="4" name="Date Placeholder 3">
-            <a:extLst>
-              <a:ext uri="{FF2B5EF4-FFF2-40B4-BE49-F238E27FC236}">
-                <a16:creationId xmlns:a16="http://schemas.microsoft.com/office/drawing/2014/main" id="{CAA42C02-B375-5390-499C-B74F44D5B890}"/>
-              </a:ext>
-            </a:extLst>
-          </p:cNvPr>
-          <p:cNvSpPr>
-            <a:spLocks noGrp="1"/>
-          </p:cNvSpPr>
-          <p:nvPr>
-            <p:ph type="dt" sz="half" idx="10"/>
-          </p:nvPr>
-        </p:nvSpPr>
-        <p:spPr/>
-        <p:txBody>
-          <a:bodyPr/>
-          <a:lstStyle/>
-          <a:p>
-            <a:r>
-              <a:rPr lang="en-US"/>
-              <a:t>3/1/20XX</a:t>
-            </a:r>
-          </a:p>
-        </p:txBody>
-      </p:sp>
-      <p:sp>
-        <p:nvSpPr>
-          <p:cNvPr id="5" name="Footer Placeholder 4">
-            <a:extLst>
-              <a:ext uri="{FF2B5EF4-FFF2-40B4-BE49-F238E27FC236}">
-                <a16:creationId xmlns:a16="http://schemas.microsoft.com/office/drawing/2014/main" id="{07697138-8DC0-685B-6791-6EE9FB4BD871}"/>
-              </a:ext>
-            </a:extLst>
-          </p:cNvPr>
-          <p:cNvSpPr>
-            <a:spLocks noGrp="1"/>
-          </p:cNvSpPr>
-          <p:nvPr>
-            <p:ph type="ftr" sz="quarter" idx="11"/>
-          </p:nvPr>
-        </p:nvSpPr>
-        <p:spPr/>
-        <p:txBody>
-          <a:bodyPr/>
-          <a:lstStyle/>
-          <a:p>
-            <a:r>
-              <a:rPr lang="en-US"/>
-              <a:t>SAMPLE FOOTER TEXT</a:t>
+              <a:t>Greatest threat to modern computing, ever</a:t>
             </a:r>
           </a:p>
         </p:txBody>
@@ -10388,7 +11498,7 @@
           <p:cNvPr id="6" name="Slide Number Placeholder 5">
             <a:extLst>
               <a:ext uri="{FF2B5EF4-FFF2-40B4-BE49-F238E27FC236}">
-                <a16:creationId xmlns:a16="http://schemas.microsoft.com/office/drawing/2014/main" id="{722A2190-2749-C128-5DA7-929D31EFB9A1}"/>
+                <a16:creationId xmlns:a16="http://schemas.microsoft.com/office/drawing/2014/main" id="{96DFDC1D-66C6-6DC0-039F-B29B6ED7C028}"/>
               </a:ext>
             </a:extLst>
           </p:cNvPr>
@@ -10417,7 +11527,7 @@
           <p:cNvPr id="7" name="Title 6">
             <a:extLst>
               <a:ext uri="{FF2B5EF4-FFF2-40B4-BE49-F238E27FC236}">
-                <a16:creationId xmlns:a16="http://schemas.microsoft.com/office/drawing/2014/main" id="{03E960F7-DDB1-3097-6DD7-69A6CFBC5B8F}"/>
+                <a16:creationId xmlns:a16="http://schemas.microsoft.com/office/drawing/2014/main" id="{3FF26FFB-7867-D4F5-6F1B-D795CE65EB1F}"/>
               </a:ext>
             </a:extLst>
           </p:cNvPr>
@@ -10430,68 +11540,14 @@
         </p:nvSpPr>
         <p:spPr/>
         <p:txBody>
-          <a:bodyPr/>
+          <a:bodyPr>
+            <a:normAutofit/>
+          </a:bodyPr>
           <a:lstStyle/>
           <a:p>
             <a:r>
               <a:rPr lang="en-US" dirty="0"/>
-              <a:t>Models of Computation</a:t>
-            </a:r>
-          </a:p>
-        </p:txBody>
-      </p:sp>
-      <p:sp>
-        <p:nvSpPr>
-          <p:cNvPr id="8" name="Text Placeholder 7">
-            <a:extLst>
-              <a:ext uri="{FF2B5EF4-FFF2-40B4-BE49-F238E27FC236}">
-                <a16:creationId xmlns:a16="http://schemas.microsoft.com/office/drawing/2014/main" id="{1F7AA011-7A78-0883-6C6C-89F42BAA0D87}"/>
-              </a:ext>
-            </a:extLst>
-          </p:cNvPr>
-          <p:cNvSpPr>
-            <a:spLocks noGrp="1"/>
-          </p:cNvSpPr>
-          <p:nvPr>
-            <p:ph type="body" idx="1"/>
-          </p:nvPr>
-        </p:nvSpPr>
-        <p:spPr/>
-        <p:txBody>
-          <a:bodyPr/>
-          <a:lstStyle/>
-          <a:p>
-            <a:r>
-              <a:rPr lang="en-US" dirty="0"/>
-              <a:t>Classical	</a:t>
-            </a:r>
-          </a:p>
-        </p:txBody>
-      </p:sp>
-      <p:sp>
-        <p:nvSpPr>
-          <p:cNvPr id="9" name="Text Placeholder 8">
-            <a:extLst>
-              <a:ext uri="{FF2B5EF4-FFF2-40B4-BE49-F238E27FC236}">
-                <a16:creationId xmlns:a16="http://schemas.microsoft.com/office/drawing/2014/main" id="{D4E57944-992C-AEAD-CEA6-6A7356BE405A}"/>
-              </a:ext>
-            </a:extLst>
-          </p:cNvPr>
-          <p:cNvSpPr>
-            <a:spLocks noGrp="1"/>
-          </p:cNvSpPr>
-          <p:nvPr>
-            <p:ph type="body" sz="quarter" idx="13"/>
-          </p:nvPr>
-        </p:nvSpPr>
-        <p:spPr/>
-        <p:txBody>
-          <a:bodyPr/>
-          <a:lstStyle/>
-          <a:p>
-            <a:r>
-              <a:rPr lang="en-US" dirty="0"/>
-              <a:t>Quantum</a:t>
+              <a:t>Shor’s Algorithm</a:t>
             </a:r>
           </a:p>
         </p:txBody>
@@ -10499,7 +11555,7 @@
     </p:spTree>
     <p:extLst>
       <p:ext uri="{BB962C8B-B14F-4D97-AF65-F5344CB8AC3E}">
-        <p14:creationId xmlns:p14="http://schemas.microsoft.com/office/powerpoint/2010/main" val="2968149438"/>
+        <p14:creationId xmlns:p14="http://schemas.microsoft.com/office/powerpoint/2010/main" val="2435015616"/>
       </p:ext>
     </p:extLst>
   </p:cSld>
@@ -10514,7 +11570,13 @@
   <p:cSld>
     <p:spTree>
       <p:nvGrpSpPr>
-        <p:cNvPr id="1" name=""/>
+        <p:cNvPr id="1" name="">
+          <a:extLst>
+            <a:ext uri="{FF2B5EF4-FFF2-40B4-BE49-F238E27FC236}">
+              <a16:creationId xmlns:a16="http://schemas.microsoft.com/office/drawing/2014/main" id="{2B113FB1-4EC9-055F-BA46-81095423EA9C}"/>
+            </a:ext>
+          </a:extLst>
+        </p:cNvPr>
         <p:cNvGrpSpPr/>
         <p:nvPr/>
       </p:nvGrpSpPr>
@@ -10531,7 +11593,7 @@
           <p:cNvPr id="2" name="Content Placeholder 1">
             <a:extLst>
               <a:ext uri="{FF2B5EF4-FFF2-40B4-BE49-F238E27FC236}">
-                <a16:creationId xmlns:a16="http://schemas.microsoft.com/office/drawing/2014/main" id="{1E4DC75C-6477-4B8A-8EE6-4FF58D8F3DD5}"/>
+                <a16:creationId xmlns:a16="http://schemas.microsoft.com/office/drawing/2014/main" id="{3BE495EA-D0A0-312A-B75D-D70CC5056A01}"/>
               </a:ext>
             </a:extLst>
           </p:cNvPr>
@@ -10554,15 +11616,24 @@
           <a:p>
             <a:r>
               <a:rPr lang="en-US" dirty="0"/>
-              <a:t>There is currently a </a:t>
-            </a:r>
-            <a:r>
-              <a:rPr lang="en-US" b="1" dirty="0"/>
-              <a:t>single</a:t>
-            </a:r>
+              <a:t>Theoretical improvement over Shor’s algorithm (Regev)</a:t>
+            </a:r>
+          </a:p>
+          <a:p>
+            <a:endParaRPr lang="en-US" dirty="0"/>
+          </a:p>
+          <a:p>
             <a:r>
               <a:rPr lang="en-US" dirty="0"/>
-              <a:t> concrete use case for quantum computers</a:t>
+              <a:t>Convert Shor’s algorithm from a 2</a:t>
+            </a:r>
+            <a:r>
+              <a:rPr lang="en-US" baseline="30000" dirty="0"/>
+              <a:t>nd</a:t>
+            </a:r>
+            <a:r>
+              <a:rPr lang="en-US" dirty="0"/>
+              <a:t>-degree polynomial -&gt; 3/2-degree polynomial time (Regev)</a:t>
             </a:r>
           </a:p>
           <a:p>
@@ -10570,102 +11641,17 @@
           </a:p>
           <a:p>
             <a:r>
-              <a:rPr lang="en-US" b="1" dirty="0"/>
-              <a:t>Shor’s Algorithm</a:t>
-            </a:r>
-            <a:r>
               <a:rPr lang="en-US" dirty="0"/>
-              <a:t> – can solve </a:t>
-            </a:r>
-            <a:r>
-              <a:rPr lang="en-US" b="1" dirty="0"/>
-              <a:t>BOTH</a:t>
-            </a:r>
+              <a:t>Published in August 2023</a:t>
+            </a:r>
+          </a:p>
+          <a:p>
+            <a:endParaRPr lang="en-US" dirty="0"/>
+          </a:p>
+          <a:p>
             <a:r>
               <a:rPr lang="en-US" dirty="0"/>
-              <a:t> the prime factorization problem and discrete logarithm problem</a:t>
-            </a:r>
-          </a:p>
-          <a:p>
-            <a:endParaRPr lang="en-US" b="1" dirty="0"/>
-          </a:p>
-          <a:p>
-            <a:r>
-              <a:rPr lang="en-US" dirty="0"/>
-              <a:t>Reduce intractable problems to the </a:t>
-            </a:r>
-            <a:r>
-              <a:rPr lang="en-US" b="1" dirty="0"/>
-              <a:t>order finding problem</a:t>
-            </a:r>
-            <a:r>
-              <a:rPr lang="en-US" dirty="0"/>
-              <a:t>; then, solve with order-finding problem</a:t>
-            </a:r>
-          </a:p>
-          <a:p>
-            <a:endParaRPr lang="en-US" dirty="0"/>
-          </a:p>
-          <a:p>
-            <a:r>
-              <a:rPr lang="en-US" b="1" dirty="0"/>
-              <a:t>Greatest threat to modern computing, ever</a:t>
-            </a:r>
-          </a:p>
-        </p:txBody>
-      </p:sp>
-      <p:sp>
-        <p:nvSpPr>
-          <p:cNvPr id="4" name="Date Placeholder 3">
-            <a:extLst>
-              <a:ext uri="{FF2B5EF4-FFF2-40B4-BE49-F238E27FC236}">
-                <a16:creationId xmlns:a16="http://schemas.microsoft.com/office/drawing/2014/main" id="{90D54E86-C780-85FD-AD04-EF98E48AD907}"/>
-              </a:ext>
-            </a:extLst>
-          </p:cNvPr>
-          <p:cNvSpPr>
-            <a:spLocks noGrp="1"/>
-          </p:cNvSpPr>
-          <p:nvPr>
-            <p:ph type="dt" sz="half" idx="10"/>
-          </p:nvPr>
-        </p:nvSpPr>
-        <p:spPr/>
-        <p:txBody>
-          <a:bodyPr/>
-          <a:lstStyle/>
-          <a:p>
-            <a:r>
-              <a:rPr lang="en-US"/>
-              <a:t>3/1/20XX</a:t>
-            </a:r>
-          </a:p>
-        </p:txBody>
-      </p:sp>
-      <p:sp>
-        <p:nvSpPr>
-          <p:cNvPr id="5" name="Footer Placeholder 4">
-            <a:extLst>
-              <a:ext uri="{FF2B5EF4-FFF2-40B4-BE49-F238E27FC236}">
-                <a16:creationId xmlns:a16="http://schemas.microsoft.com/office/drawing/2014/main" id="{49EAD313-022E-DA22-C9D8-33916AB91D04}"/>
-              </a:ext>
-            </a:extLst>
-          </p:cNvPr>
-          <p:cNvSpPr>
-            <a:spLocks noGrp="1"/>
-          </p:cNvSpPr>
-          <p:nvPr>
-            <p:ph type="ftr" sz="quarter" idx="11"/>
-          </p:nvPr>
-        </p:nvSpPr>
-        <p:spPr/>
-        <p:txBody>
-          <a:bodyPr/>
-          <a:lstStyle/>
-          <a:p>
-            <a:r>
-              <a:rPr lang="en-US"/>
-              <a:t>SAMPLE FOOTER TEXT</a:t>
+              <a:t>Severely increases threat posed by quantum computers</a:t>
             </a:r>
           </a:p>
         </p:txBody>
@@ -10675,7 +11661,7 @@
           <p:cNvPr id="6" name="Slide Number Placeholder 5">
             <a:extLst>
               <a:ext uri="{FF2B5EF4-FFF2-40B4-BE49-F238E27FC236}">
-                <a16:creationId xmlns:a16="http://schemas.microsoft.com/office/drawing/2014/main" id="{96DFDC1D-66C6-6DC0-039F-B29B6ED7C028}"/>
+                <a16:creationId xmlns:a16="http://schemas.microsoft.com/office/drawing/2014/main" id="{7CA536DE-904D-8030-416E-0CA7E851F6DF}"/>
               </a:ext>
             </a:extLst>
           </p:cNvPr>
@@ -10704,7 +11690,7 @@
           <p:cNvPr id="7" name="Title 6">
             <a:extLst>
               <a:ext uri="{FF2B5EF4-FFF2-40B4-BE49-F238E27FC236}">
-                <a16:creationId xmlns:a16="http://schemas.microsoft.com/office/drawing/2014/main" id="{3FF26FFB-7867-D4F5-6F1B-D795CE65EB1F}"/>
+                <a16:creationId xmlns:a16="http://schemas.microsoft.com/office/drawing/2014/main" id="{F116FC57-589B-53FA-0188-4D0F3483BB90}"/>
               </a:ext>
             </a:extLst>
           </p:cNvPr>
@@ -10724,7 +11710,7 @@
           <a:p>
             <a:r>
               <a:rPr lang="en-US" dirty="0"/>
-              <a:t>Shor’s Algorithm</a:t>
+              <a:t>Regev’s Algorithm</a:t>
             </a:r>
           </a:p>
         </p:txBody>
@@ -10732,7 +11718,200 @@
     </p:spTree>
     <p:extLst>
       <p:ext uri="{BB962C8B-B14F-4D97-AF65-F5344CB8AC3E}">
-        <p14:creationId xmlns:p14="http://schemas.microsoft.com/office/powerpoint/2010/main" val="2435015616"/>
+        <p14:creationId xmlns:p14="http://schemas.microsoft.com/office/powerpoint/2010/main" val="893333082"/>
+      </p:ext>
+    </p:extLst>
+  </p:cSld>
+  <p:clrMapOvr>
+    <a:masterClrMapping/>
+  </p:clrMapOvr>
+</p:sld>
+</file>
+
+<file path=ppt/slides/slide9.xml><?xml version="1.0" encoding="utf-8"?>
+<p:sld xmlns:a="http://schemas.openxmlformats.org/drawingml/2006/main" xmlns:r="http://schemas.openxmlformats.org/officeDocument/2006/relationships" xmlns:p="http://schemas.openxmlformats.org/presentationml/2006/main">
+  <p:cSld>
+    <p:spTree>
+      <p:nvGrpSpPr>
+        <p:cNvPr id="1" name="">
+          <a:extLst>
+            <a:ext uri="{FF2B5EF4-FFF2-40B4-BE49-F238E27FC236}">
+              <a16:creationId xmlns:a16="http://schemas.microsoft.com/office/drawing/2014/main" id="{2B113FB1-4EC9-055F-BA46-81095423EA9C}"/>
+            </a:ext>
+          </a:extLst>
+        </p:cNvPr>
+        <p:cNvGrpSpPr/>
+        <p:nvPr/>
+      </p:nvGrpSpPr>
+      <p:grpSpPr>
+        <a:xfrm>
+          <a:off x="0" y="0"/>
+          <a:ext cx="0" cy="0"/>
+          <a:chOff x="0" y="0"/>
+          <a:chExt cx="0" cy="0"/>
+        </a:xfrm>
+      </p:grpSpPr>
+      <p:sp>
+        <p:nvSpPr>
+          <p:cNvPr id="2" name="Content Placeholder 1">
+            <a:extLst>
+              <a:ext uri="{FF2B5EF4-FFF2-40B4-BE49-F238E27FC236}">
+                <a16:creationId xmlns:a16="http://schemas.microsoft.com/office/drawing/2014/main" id="{3BE495EA-D0A0-312A-B75D-D70CC5056A01}"/>
+              </a:ext>
+            </a:extLst>
+          </p:cNvPr>
+          <p:cNvSpPr>
+            <a:spLocks noGrp="1"/>
+          </p:cNvSpPr>
+          <p:nvPr>
+            <p:ph sz="half" idx="2"/>
+          </p:nvPr>
+        </p:nvSpPr>
+        <p:spPr>
+          <a:xfrm>
+            <a:off x="839788" y="2006600"/>
+            <a:ext cx="10514012" cy="4000183"/>
+          </a:xfrm>
+        </p:spPr>
+        <p:txBody>
+          <a:bodyPr/>
+          <a:lstStyle/>
+          <a:p>
+            <a:r>
+              <a:rPr lang="en-US" dirty="0"/>
+              <a:t>NIST recently standardized three protocols for post-quantum cryptographic communication (“Module-Lattice-Based Key Encapsulation Mechanism Standard”)</a:t>
+            </a:r>
+          </a:p>
+          <a:p>
+            <a:endParaRPr lang="en-US" dirty="0"/>
+          </a:p>
+          <a:p>
+            <a:r>
+              <a:rPr lang="en-US" dirty="0"/>
+              <a:t>One of these, FIPS 203, defines a KEM using </a:t>
+            </a:r>
+            <a:r>
+              <a:rPr lang="en-US" dirty="0" err="1"/>
+              <a:t>Kyber</a:t>
+            </a:r>
+            <a:r>
+              <a:rPr lang="en-US" dirty="0"/>
+              <a:t>; therefore, we wish to test it (“Digital Signature Standard”)</a:t>
+            </a:r>
+          </a:p>
+          <a:p>
+            <a:endParaRPr lang="en-US" dirty="0"/>
+          </a:p>
+          <a:p>
+            <a:r>
+              <a:rPr lang="en-US" dirty="0" err="1"/>
+              <a:t>Kyber</a:t>
+            </a:r>
+            <a:r>
+              <a:rPr lang="en-US" dirty="0"/>
+              <a:t> works on ARM very well – advantageous in SoC and IoT workloads (Liu and Seo)</a:t>
+            </a:r>
+          </a:p>
+          <a:p>
+            <a:endParaRPr lang="en-US" dirty="0"/>
+          </a:p>
+          <a:p>
+            <a:r>
+              <a:rPr lang="en-US" dirty="0" err="1"/>
+              <a:t>Kyber</a:t>
+            </a:r>
+            <a:r>
+              <a:rPr lang="en-US" dirty="0"/>
+              <a:t> is </a:t>
+            </a:r>
+            <a:r>
+              <a:rPr lang="en-US" b="1" dirty="0"/>
+              <a:t>very fast on small computers, with small payloads </a:t>
+            </a:r>
+            <a:r>
+              <a:rPr lang="en-US" dirty="0"/>
+              <a:t> - but not tested on big ones (</a:t>
+            </a:r>
+            <a:r>
+              <a:rPr lang="en-US" dirty="0" err="1"/>
+              <a:t>Seyhan</a:t>
+            </a:r>
+            <a:r>
+              <a:rPr lang="en-US" dirty="0"/>
+              <a:t> et al.)</a:t>
+            </a:r>
+          </a:p>
+          <a:p>
+            <a:endParaRPr lang="en-US" dirty="0"/>
+          </a:p>
+          <a:p>
+            <a:endParaRPr lang="en-US" dirty="0"/>
+          </a:p>
+        </p:txBody>
+      </p:sp>
+      <p:sp>
+        <p:nvSpPr>
+          <p:cNvPr id="6" name="Slide Number Placeholder 5">
+            <a:extLst>
+              <a:ext uri="{FF2B5EF4-FFF2-40B4-BE49-F238E27FC236}">
+                <a16:creationId xmlns:a16="http://schemas.microsoft.com/office/drawing/2014/main" id="{7CA536DE-904D-8030-416E-0CA7E851F6DF}"/>
+              </a:ext>
+            </a:extLst>
+          </p:cNvPr>
+          <p:cNvSpPr>
+            <a:spLocks noGrp="1"/>
+          </p:cNvSpPr>
+          <p:nvPr>
+            <p:ph type="sldNum" sz="quarter" idx="12"/>
+          </p:nvPr>
+        </p:nvSpPr>
+        <p:spPr/>
+        <p:txBody>
+          <a:bodyPr/>
+          <a:lstStyle/>
+          <a:p>
+            <a:fld id="{28844951-7827-47D4-8276-7DDE1FA7D85A}" type="slidenum">
+              <a:rPr lang="en-US" smtClean="0"/>
+              <a:t>9</a:t>
+            </a:fld>
+            <a:endParaRPr lang="en-US"/>
+          </a:p>
+        </p:txBody>
+      </p:sp>
+      <p:sp>
+        <p:nvSpPr>
+          <p:cNvPr id="7" name="Title 6">
+            <a:extLst>
+              <a:ext uri="{FF2B5EF4-FFF2-40B4-BE49-F238E27FC236}">
+                <a16:creationId xmlns:a16="http://schemas.microsoft.com/office/drawing/2014/main" id="{F116FC57-589B-53FA-0188-4D0F3483BB90}"/>
+              </a:ext>
+            </a:extLst>
+          </p:cNvPr>
+          <p:cNvSpPr>
+            <a:spLocks noGrp="1"/>
+          </p:cNvSpPr>
+          <p:nvPr>
+            <p:ph type="title"/>
+          </p:nvPr>
+        </p:nvSpPr>
+        <p:spPr/>
+        <p:txBody>
+          <a:bodyPr>
+            <a:normAutofit/>
+          </a:bodyPr>
+          <a:lstStyle/>
+          <a:p>
+            <a:r>
+              <a:rPr lang="en-US" dirty="0"/>
+              <a:t>Lit Review</a:t>
+            </a:r>
+          </a:p>
+        </p:txBody>
+      </p:sp>
+    </p:spTree>
+    <p:extLst>
+      <p:ext uri="{BB962C8B-B14F-4D97-AF65-F5344CB8AC3E}">
+        <p14:creationId xmlns:p14="http://schemas.microsoft.com/office/powerpoint/2010/main" val="2422718037"/>
       </p:ext>
     </p:extLst>
   </p:cSld>
@@ -11841,17 +13020,17 @@
 <ds:datastoreItem xmlns:ds="http://schemas.openxmlformats.org/officeDocument/2006/customXml" ds:itemID="{DAAFE2A1-77F8-441E-9B9F-DD61C354F4FE}">
   <ds:schemaRefs>
     <ds:schemaRef ds:uri="http://purl.org/dc/elements/1.1/"/>
+    <ds:schemaRef ds:uri="230e9df3-be65-4c73-a93b-d1236ebd677e"/>
+    <ds:schemaRef ds:uri="71af3243-3dd4-4a8d-8c0d-dd76da1f02a5"/>
+    <ds:schemaRef ds:uri="http://purl.org/dc/dcmitype/"/>
+    <ds:schemaRef ds:uri="16c05727-aa75-4e4a-9b5f-8a80a1165891"/>
+    <ds:schemaRef ds:uri="http://schemas.microsoft.com/office/2006/documentManagement/types"/>
+    <ds:schemaRef ds:uri="http://schemas.openxmlformats.org/package/2006/metadata/core-properties"/>
+    <ds:schemaRef ds:uri="http://www.w3.org/XML/1998/namespace"/>
+    <ds:schemaRef ds:uri="http://schemas.microsoft.com/sharepoint/v3"/>
+    <ds:schemaRef ds:uri="http://schemas.microsoft.com/office/infopath/2007/PartnerControls"/>
     <ds:schemaRef ds:uri="http://schemas.microsoft.com/office/2006/metadata/properties"/>
-    <ds:schemaRef ds:uri="http://www.w3.org/XML/1998/namespace"/>
     <ds:schemaRef ds:uri="http://purl.org/dc/terms/"/>
-    <ds:schemaRef ds:uri="71af3243-3dd4-4a8d-8c0d-dd76da1f02a5"/>
-    <ds:schemaRef ds:uri="http://schemas.microsoft.com/office/2006/documentManagement/types"/>
-    <ds:schemaRef ds:uri="http://schemas.microsoft.com/office/infopath/2007/PartnerControls"/>
-    <ds:schemaRef ds:uri="http://schemas.openxmlformats.org/package/2006/metadata/core-properties"/>
-    <ds:schemaRef ds:uri="http://purl.org/dc/dcmitype/"/>
-    <ds:schemaRef ds:uri="230e9df3-be65-4c73-a93b-d1236ebd677e"/>
-    <ds:schemaRef ds:uri="16c05727-aa75-4e4a-9b5f-8a80a1165891"/>
-    <ds:schemaRef ds:uri="http://schemas.microsoft.com/sharepoint/v3"/>
   </ds:schemaRefs>
 </ds:datastoreItem>
 </file>

</xml_diff>